<commit_message>
add chapter for basic web concepts, merge part 1 and part 2 ...
</commit_message>
<xml_diff>
--- a/images/survival-kit/shinyapp-lifecycle.pptx
+++ b/images/survival-kit/shinyapp-lifecycle.pptx
@@ -104,6 +104,11 @@
       </a:defRPr>
     </a:lvl9pPr>
   </p:defaultTextStyle>
+  <p:extLst>
+    <p:ext uri="{EFAFB233-063F-42B5-8137-9DF3F51BA10A}">
+      <p15:sldGuideLst xmlns:p15="http://schemas.microsoft.com/office/powerpoint/2012/main"/>
+    </p:ext>
+  </p:extLst>
 </p:presentation>
 </file>
 
@@ -256,7 +261,7 @@
           <a:p>
             <a:fld id="{883890DE-E65D-204A-A590-460E83A1A90C}" type="datetimeFigureOut">
               <a:rPr lang="en-CH" smtClean="0"/>
-              <a:t>06.11.20</a:t>
+              <a:t>03.03.21</a:t>
             </a:fld>
             <a:endParaRPr lang="en-CH"/>
           </a:p>
@@ -456,7 +461,7 @@
           <a:p>
             <a:fld id="{883890DE-E65D-204A-A590-460E83A1A90C}" type="datetimeFigureOut">
               <a:rPr lang="en-CH" smtClean="0"/>
-              <a:t>06.11.20</a:t>
+              <a:t>03.03.21</a:t>
             </a:fld>
             <a:endParaRPr lang="en-CH"/>
           </a:p>
@@ -666,7 +671,7 @@
           <a:p>
             <a:fld id="{883890DE-E65D-204A-A590-460E83A1A90C}" type="datetimeFigureOut">
               <a:rPr lang="en-CH" smtClean="0"/>
-              <a:t>06.11.20</a:t>
+              <a:t>03.03.21</a:t>
             </a:fld>
             <a:endParaRPr lang="en-CH"/>
           </a:p>
@@ -866,7 +871,7 @@
           <a:p>
             <a:fld id="{883890DE-E65D-204A-A590-460E83A1A90C}" type="datetimeFigureOut">
               <a:rPr lang="en-CH" smtClean="0"/>
-              <a:t>06.11.20</a:t>
+              <a:t>03.03.21</a:t>
             </a:fld>
             <a:endParaRPr lang="en-CH"/>
           </a:p>
@@ -1142,7 +1147,7 @@
           <a:p>
             <a:fld id="{883890DE-E65D-204A-A590-460E83A1A90C}" type="datetimeFigureOut">
               <a:rPr lang="en-CH" smtClean="0"/>
-              <a:t>06.11.20</a:t>
+              <a:t>03.03.21</a:t>
             </a:fld>
             <a:endParaRPr lang="en-CH"/>
           </a:p>
@@ -1410,7 +1415,7 @@
           <a:p>
             <a:fld id="{883890DE-E65D-204A-A590-460E83A1A90C}" type="datetimeFigureOut">
               <a:rPr lang="en-CH" smtClean="0"/>
-              <a:t>06.11.20</a:t>
+              <a:t>03.03.21</a:t>
             </a:fld>
             <a:endParaRPr lang="en-CH"/>
           </a:p>
@@ -1825,7 +1830,7 @@
           <a:p>
             <a:fld id="{883890DE-E65D-204A-A590-460E83A1A90C}" type="datetimeFigureOut">
               <a:rPr lang="en-CH" smtClean="0"/>
-              <a:t>06.11.20</a:t>
+              <a:t>03.03.21</a:t>
             </a:fld>
             <a:endParaRPr lang="en-CH"/>
           </a:p>
@@ -1967,7 +1972,7 @@
           <a:p>
             <a:fld id="{883890DE-E65D-204A-A590-460E83A1A90C}" type="datetimeFigureOut">
               <a:rPr lang="en-CH" smtClean="0"/>
-              <a:t>06.11.20</a:t>
+              <a:t>03.03.21</a:t>
             </a:fld>
             <a:endParaRPr lang="en-CH"/>
           </a:p>
@@ -2080,7 +2085,7 @@
           <a:p>
             <a:fld id="{883890DE-E65D-204A-A590-460E83A1A90C}" type="datetimeFigureOut">
               <a:rPr lang="en-CH" smtClean="0"/>
-              <a:t>06.11.20</a:t>
+              <a:t>03.03.21</a:t>
             </a:fld>
             <a:endParaRPr lang="en-CH"/>
           </a:p>
@@ -2393,7 +2398,7 @@
           <a:p>
             <a:fld id="{883890DE-E65D-204A-A590-460E83A1A90C}" type="datetimeFigureOut">
               <a:rPr lang="en-CH" smtClean="0"/>
-              <a:t>06.11.20</a:t>
+              <a:t>03.03.21</a:t>
             </a:fld>
             <a:endParaRPr lang="en-CH"/>
           </a:p>
@@ -2682,7 +2687,7 @@
           <a:p>
             <a:fld id="{883890DE-E65D-204A-A590-460E83A1A90C}" type="datetimeFigureOut">
               <a:rPr lang="en-CH" smtClean="0"/>
-              <a:t>06.11.20</a:t>
+              <a:t>03.03.21</a:t>
             </a:fld>
             <a:endParaRPr lang="en-CH"/>
           </a:p>
@@ -2925,7 +2930,7 @@
           <a:p>
             <a:fld id="{883890DE-E65D-204A-A590-460E83A1A90C}" type="datetimeFigureOut">
               <a:rPr lang="en-CH" smtClean="0"/>
-              <a:t>06.11.20</a:t>
+              <a:t>03.03.21</a:t>
             </a:fld>
             <a:endParaRPr lang="en-CH"/>
           </a:p>
@@ -3356,8 +3361,8 @@
         </p:nvSpPr>
         <p:spPr>
           <a:xfrm>
-            <a:off x="43209" y="711198"/>
-            <a:ext cx="4750265" cy="5454869"/>
+            <a:off x="5449027" y="647313"/>
+            <a:ext cx="6533522" cy="6009750"/>
           </a:xfrm>
           <a:prstGeom prst="rect">
             <a:avLst/>
@@ -3408,8 +3413,8 @@
         </p:nvSpPr>
         <p:spPr>
           <a:xfrm>
-            <a:off x="901111" y="273597"/>
-            <a:ext cx="2068515" cy="369332"/>
+            <a:off x="6644443" y="209712"/>
+            <a:ext cx="3760709" cy="369332"/>
           </a:xfrm>
           <a:prstGeom prst="rect">
             <a:avLst/>
@@ -3428,7 +3433,7 @@
             </a:r>
             <a:r>
               <a:rPr lang="en-CH" dirty="0"/>
-              <a:t>: Shiny Server</a:t>
+              <a:t>: Shiny Server (srv/shiny-server)</a:t>
             </a:r>
           </a:p>
         </p:txBody>
@@ -3447,7 +3452,7 @@
         </p:nvSpPr>
         <p:spPr>
           <a:xfrm>
-            <a:off x="9175038" y="1456540"/>
+            <a:off x="473008" y="2214459"/>
             <a:ext cx="1944151" cy="941396"/>
           </a:xfrm>
           <a:prstGeom prst="rect">
@@ -3505,8 +3510,8 @@
         </p:nvSpPr>
         <p:spPr>
           <a:xfrm>
-            <a:off x="7415935" y="1925698"/>
-            <a:ext cx="1658619" cy="923330"/>
+            <a:off x="6249298" y="2117104"/>
+            <a:ext cx="1864752" cy="523220"/>
           </a:xfrm>
           <a:prstGeom prst="rect">
             <a:avLst/>
@@ -3520,14 +3525,14 @@
           <a:lstStyle/>
           <a:p>
             <a:r>
-              <a:rPr lang="en-CH" dirty="0">
+              <a:rPr lang="en-CH" sz="1400" dirty="0">
                 <a:solidFill>
                   <a:schemeClr val="bg1">
                     <a:lumMod val="65000"/>
                   </a:schemeClr>
                 </a:solidFill>
               </a:rPr>
-              <a:t>Server answers and return HTML page</a:t>
+              <a:t>Returns HTML content = request</a:t>
             </a:r>
           </a:p>
         </p:txBody>
@@ -3546,7 +3551,7 @@
         </p:nvSpPr>
         <p:spPr>
           <a:xfrm>
-            <a:off x="10057896" y="2359799"/>
+            <a:off x="710181" y="3828115"/>
             <a:ext cx="1871610" cy="646331"/>
           </a:xfrm>
           <a:prstGeom prst="rect">
@@ -3586,9 +3591,9 @@
           <p:nvPr/>
         </p:nvSpPr>
         <p:spPr>
-          <a:xfrm rot="10800000">
-            <a:off x="5267142" y="1362851"/>
-            <a:ext cx="1606378" cy="354994"/>
+          <a:xfrm>
+            <a:off x="3868308" y="1956710"/>
+            <a:ext cx="1038274" cy="354994"/>
           </a:xfrm>
           <a:prstGeom prst="rightArrow">
             <a:avLst/>
@@ -3650,9 +3655,9 @@
           <p:nvPr/>
         </p:nvSpPr>
         <p:spPr>
-          <a:xfrm>
-            <a:off x="5344254" y="1693565"/>
-            <a:ext cx="1606378" cy="354994"/>
+          <a:xfrm rot="10800000">
+            <a:off x="3823067" y="2324501"/>
+            <a:ext cx="1038274" cy="354994"/>
           </a:xfrm>
           <a:prstGeom prst="rightArrow">
             <a:avLst/>
@@ -3715,49 +3720,8 @@
         </p:nvSpPr>
         <p:spPr>
           <a:xfrm>
-            <a:off x="5166003" y="2479696"/>
-            <a:ext cx="1901996" cy="369332"/>
-          </a:xfrm>
-          <a:prstGeom prst="rect">
-            <a:avLst/>
-          </a:prstGeom>
-          <a:noFill/>
-        </p:spPr>
-        <p:txBody>
-          <a:bodyPr wrap="none" rtlCol="0">
-            <a:spAutoFit/>
-          </a:bodyPr>
-          <a:lstStyle/>
-          <a:p>
-            <a:r>
-              <a:rPr lang="en-CH" dirty="0">
-                <a:solidFill>
-                  <a:schemeClr val="bg1">
-                    <a:lumMod val="65000"/>
-                  </a:schemeClr>
-                </a:solidFill>
-              </a:rPr>
-              <a:t>Handshake (HTTP)</a:t>
-            </a:r>
-          </a:p>
-        </p:txBody>
-      </p:sp>
-      <p:sp>
-        <p:nvSpPr>
-          <p:cNvPr id="15" name="TextBox 14">
-            <a:extLst>
-              <a:ext uri="{FF2B5EF4-FFF2-40B4-BE49-F238E27FC236}">
-                <a16:creationId xmlns:a16="http://schemas.microsoft.com/office/drawing/2014/main" id="{6136C5B6-3FC7-0841-9926-22279158DCD1}"/>
-              </a:ext>
-            </a:extLst>
-          </p:cNvPr>
-          <p:cNvSpPr txBox="1"/>
-          <p:nvPr/>
-        </p:nvSpPr>
-        <p:spPr>
-          <a:xfrm>
-            <a:off x="5592181" y="1128557"/>
-            <a:ext cx="1156881" cy="369332"/>
+            <a:off x="3880280" y="2948828"/>
+            <a:ext cx="948513" cy="369332"/>
           </a:xfrm>
           <a:prstGeom prst="rect">
             <a:avLst/>
@@ -3778,7 +3742,48 @@
                   </a:schemeClr>
                 </a:solidFill>
               </a:rPr>
-              <a:t>CONNECT</a:t>
+              <a:t>HTTP(S)</a:t>
+            </a:r>
+          </a:p>
+        </p:txBody>
+      </p:sp>
+      <p:sp>
+        <p:nvSpPr>
+          <p:cNvPr id="15" name="TextBox 14">
+            <a:extLst>
+              <a:ext uri="{FF2B5EF4-FFF2-40B4-BE49-F238E27FC236}">
+                <a16:creationId xmlns:a16="http://schemas.microsoft.com/office/drawing/2014/main" id="{6136C5B6-3FC7-0841-9926-22279158DCD1}"/>
+              </a:ext>
+            </a:extLst>
+          </p:cNvPr>
+          <p:cNvSpPr txBox="1"/>
+          <p:nvPr/>
+        </p:nvSpPr>
+        <p:spPr>
+          <a:xfrm>
+            <a:off x="3972500" y="1734167"/>
+            <a:ext cx="856293" cy="369332"/>
+          </a:xfrm>
+          <a:prstGeom prst="rect">
+            <a:avLst/>
+          </a:prstGeom>
+          <a:noFill/>
+        </p:spPr>
+        <p:txBody>
+          <a:bodyPr wrap="square" rtlCol="0">
+            <a:spAutoFit/>
+          </a:bodyPr>
+          <a:lstStyle/>
+          <a:p>
+            <a:r>
+              <a:rPr lang="en-CH" b="1" dirty="0">
+                <a:solidFill>
+                  <a:schemeClr val="bg1">
+                    <a:lumMod val="65000"/>
+                  </a:schemeClr>
+                </a:solidFill>
+              </a:rPr>
+              <a:t>GET</a:t>
             </a:r>
           </a:p>
         </p:txBody>
@@ -3797,8 +3802,8 @@
         </p:nvSpPr>
         <p:spPr>
           <a:xfrm>
-            <a:off x="5143264" y="1131788"/>
-            <a:ext cx="1901996" cy="1124465"/>
+            <a:off x="3751855" y="1749888"/>
+            <a:ext cx="1229345" cy="1124465"/>
           </a:xfrm>
           <a:prstGeom prst="rect">
             <a:avLst/>
@@ -3846,84 +3851,6 @@
       </p:sp>
       <p:sp>
         <p:nvSpPr>
-          <p:cNvPr id="23" name="TextBox 22">
-            <a:extLst>
-              <a:ext uri="{FF2B5EF4-FFF2-40B4-BE49-F238E27FC236}">
-                <a16:creationId xmlns:a16="http://schemas.microsoft.com/office/drawing/2014/main" id="{B22ED76A-E414-554C-9246-EA1884E566BC}"/>
-              </a:ext>
-            </a:extLst>
-          </p:cNvPr>
-          <p:cNvSpPr txBox="1"/>
-          <p:nvPr/>
-        </p:nvSpPr>
-        <p:spPr>
-          <a:xfrm>
-            <a:off x="9524730" y="3325914"/>
-            <a:ext cx="1797287" cy="2585323"/>
-          </a:xfrm>
-          <a:prstGeom prst="rect">
-            <a:avLst/>
-          </a:prstGeom>
-          <a:noFill/>
-        </p:spPr>
-        <p:txBody>
-          <a:bodyPr wrap="square" rtlCol="0">
-            <a:spAutoFit/>
-          </a:bodyPr>
-          <a:lstStyle/>
-          <a:p>
-            <a:r>
-              <a:rPr lang="en-CH" b="1" dirty="0"/>
-              <a:t>onOpen:</a:t>
-            </a:r>
-          </a:p>
-          <a:p>
-            <a:r>
-              <a:rPr lang="en-CH" b="1" dirty="0"/>
-              <a:t>// do something</a:t>
-            </a:r>
-          </a:p>
-          <a:p>
-            <a:endParaRPr lang="en-CH" b="1" dirty="0"/>
-          </a:p>
-          <a:p>
-            <a:r>
-              <a:rPr lang="en-CH" b="1" dirty="0"/>
-              <a:t>onMessage:</a:t>
-            </a:r>
-          </a:p>
-          <a:p>
-            <a:r>
-              <a:rPr lang="en-CH" b="1" dirty="0"/>
-              <a:t> // do something</a:t>
-            </a:r>
-          </a:p>
-          <a:p>
-            <a:endParaRPr lang="en-CH" b="1" dirty="0"/>
-          </a:p>
-          <a:p>
-            <a:r>
-              <a:rPr lang="en-GB" b="1" dirty="0" err="1"/>
-              <a:t>onError</a:t>
-            </a:r>
-            <a:r>
-              <a:rPr lang="en-GB" b="1" dirty="0"/>
-              <a:t>:</a:t>
-            </a:r>
-          </a:p>
-          <a:p>
-            <a:r>
-              <a:rPr lang="en-CH" b="1" dirty="0"/>
-              <a:t>// do something</a:t>
-            </a:r>
-          </a:p>
-          <a:p>
-            <a:endParaRPr lang="en-CH" b="1" dirty="0"/>
-          </a:p>
-        </p:txBody>
-      </p:sp>
-      <p:sp>
-        <p:nvSpPr>
           <p:cNvPr id="24" name="Rectangle 23">
             <a:extLst>
               <a:ext uri="{FF2B5EF4-FFF2-40B4-BE49-F238E27FC236}">
@@ -3936,8 +3863,8 @@
         </p:nvSpPr>
         <p:spPr>
           <a:xfrm>
-            <a:off x="7398527" y="732342"/>
-            <a:ext cx="4658489" cy="5454869"/>
+            <a:off x="65869" y="637901"/>
+            <a:ext cx="3451382" cy="5454869"/>
           </a:xfrm>
           <a:prstGeom prst="rect">
             <a:avLst/>
@@ -3976,28 +3903,223 @@
       </p:sp>
       <p:sp>
         <p:nvSpPr>
-          <p:cNvPr id="25" name="Rectangle 24">
-            <a:extLst>
-              <a:ext uri="{FF2B5EF4-FFF2-40B4-BE49-F238E27FC236}">
-                <a16:creationId xmlns:a16="http://schemas.microsoft.com/office/drawing/2014/main" id="{54AE85E0-30E6-0A48-8092-DCEF7495B3FF}"/>
-              </a:ext>
-            </a:extLst>
-          </p:cNvPr>
-          <p:cNvSpPr/>
+          <p:cNvPr id="27" name="TextBox 26">
+            <a:extLst>
+              <a:ext uri="{FF2B5EF4-FFF2-40B4-BE49-F238E27FC236}">
+                <a16:creationId xmlns:a16="http://schemas.microsoft.com/office/drawing/2014/main" id="{20B5E63F-0EC3-BF48-BFF4-C452D3A3F34F}"/>
+              </a:ext>
+            </a:extLst>
+          </p:cNvPr>
+          <p:cNvSpPr txBox="1"/>
           <p:nvPr/>
         </p:nvSpPr>
         <p:spPr>
           <a:xfrm>
-            <a:off x="9442789" y="3252657"/>
-            <a:ext cx="1879228" cy="2524717"/>
+            <a:off x="122542" y="6235000"/>
+            <a:ext cx="3428896" cy="584775"/>
           </a:xfrm>
           <a:prstGeom prst="rect">
             <a:avLst/>
           </a:prstGeom>
           <a:noFill/>
+        </p:spPr>
+        <p:txBody>
+          <a:bodyPr wrap="square" rtlCol="0">
+            <a:spAutoFit/>
+          </a:bodyPr>
+          <a:lstStyle/>
+          <a:p>
+            <a:r>
+              <a:rPr lang="en-CH" sz="1600" baseline="30000" dirty="0"/>
+              <a:t>*</a:t>
+            </a:r>
+            <a:r>
+              <a:rPr lang="en-CH" sz="1600" dirty="0"/>
+              <a:t>Websockets are discussed later</a:t>
+            </a:r>
+          </a:p>
+          <a:p>
+            <a:r>
+              <a:rPr lang="en-CH" sz="1600" baseline="30000" dirty="0"/>
+              <a:t>**</a:t>
+            </a:r>
+            <a:r>
+              <a:rPr lang="en-CH" sz="1600" dirty="0"/>
+              <a:t> </a:t>
+            </a:r>
+            <a:r>
+              <a:rPr lang="en-CH" sz="1600" baseline="30000" dirty="0"/>
+              <a:t>There may be multiple clients. 1 client = 1 browser tab</a:t>
+            </a:r>
+          </a:p>
+        </p:txBody>
+      </p:sp>
+      <p:cxnSp>
+        <p:nvCxnSpPr>
+          <p:cNvPr id="37" name="Straight Arrow Connector 36">
+            <a:extLst>
+              <a:ext uri="{FF2B5EF4-FFF2-40B4-BE49-F238E27FC236}">
+                <a16:creationId xmlns:a16="http://schemas.microsoft.com/office/drawing/2014/main" id="{45C40254-4B52-5749-8AB1-1801BFD42F81}"/>
+              </a:ext>
+            </a:extLst>
+          </p:cNvPr>
+          <p:cNvCxnSpPr>
+            <a:cxnSpLocks/>
+            <a:stCxn id="47" idx="2"/>
+          </p:cNvCxnSpPr>
+          <p:nvPr/>
+        </p:nvCxnSpPr>
+        <p:spPr>
+          <a:xfrm>
+            <a:off x="1872212" y="1176059"/>
+            <a:ext cx="1770471" cy="924593"/>
+          </a:xfrm>
+          <a:prstGeom prst="straightConnector1">
+            <a:avLst/>
+          </a:prstGeom>
+          <a:ln w="38100">
+            <a:solidFill>
+              <a:schemeClr val="bg1">
+                <a:lumMod val="65000"/>
+              </a:schemeClr>
+            </a:solidFill>
+            <a:prstDash val="solid"/>
+            <a:tailEnd type="triangle"/>
+          </a:ln>
+        </p:spPr>
+        <p:style>
+          <a:lnRef idx="1">
+            <a:schemeClr val="accent1"/>
+          </a:lnRef>
+          <a:fillRef idx="0">
+            <a:schemeClr val="accent1"/>
+          </a:fillRef>
+          <a:effectRef idx="0">
+            <a:schemeClr val="accent1"/>
+          </a:effectRef>
+          <a:fontRef idx="minor">
+            <a:schemeClr val="tx1"/>
+          </a:fontRef>
+        </p:style>
+      </p:cxnSp>
+      <p:sp>
+        <p:nvSpPr>
+          <p:cNvPr id="38" name="TextBox 37">
+            <a:extLst>
+              <a:ext uri="{FF2B5EF4-FFF2-40B4-BE49-F238E27FC236}">
+                <a16:creationId xmlns:a16="http://schemas.microsoft.com/office/drawing/2014/main" id="{4B1E7141-F137-4944-939C-526496DD18ED}"/>
+              </a:ext>
+            </a:extLst>
+          </p:cNvPr>
+          <p:cNvSpPr txBox="1"/>
+          <p:nvPr/>
+        </p:nvSpPr>
+        <p:spPr>
+          <a:xfrm>
+            <a:off x="930183" y="1331152"/>
+            <a:ext cx="1663414" cy="523220"/>
+          </a:xfrm>
+          <a:prstGeom prst="rect">
+            <a:avLst/>
+          </a:prstGeom>
+          <a:noFill/>
+        </p:spPr>
+        <p:txBody>
+          <a:bodyPr wrap="square" rtlCol="0">
+            <a:spAutoFit/>
+          </a:bodyPr>
+          <a:lstStyle/>
+          <a:p>
+            <a:r>
+              <a:rPr lang="en-CH" sz="1400" dirty="0">
+                <a:solidFill>
+                  <a:schemeClr val="bg1">
+                    <a:lumMod val="65000"/>
+                  </a:schemeClr>
+                </a:solidFill>
+              </a:rPr>
+              <a:t>Client browses to app url = request</a:t>
+            </a:r>
+          </a:p>
+        </p:txBody>
+      </p:sp>
+      <p:cxnSp>
+        <p:nvCxnSpPr>
+          <p:cNvPr id="40" name="Straight Arrow Connector 39">
+            <a:extLst>
+              <a:ext uri="{FF2B5EF4-FFF2-40B4-BE49-F238E27FC236}">
+                <a16:creationId xmlns:a16="http://schemas.microsoft.com/office/drawing/2014/main" id="{A77E8004-EBFB-FC4C-AB2C-4D97C38F8FF9}"/>
+              </a:ext>
+            </a:extLst>
+          </p:cNvPr>
+          <p:cNvCxnSpPr>
+            <a:cxnSpLocks/>
+          </p:cNvCxnSpPr>
+          <p:nvPr/>
+        </p:nvCxnSpPr>
+        <p:spPr>
+          <a:xfrm>
+            <a:off x="1259550" y="3234063"/>
+            <a:ext cx="0" cy="452178"/>
+          </a:xfrm>
+          <a:prstGeom prst="straightConnector1">
+            <a:avLst/>
+          </a:prstGeom>
+          <a:ln w="38100">
+            <a:solidFill>
+              <a:schemeClr val="bg1">
+                <a:lumMod val="65000"/>
+              </a:schemeClr>
+            </a:solidFill>
+            <a:prstDash val="sysDot"/>
+            <a:tailEnd type="triangle"/>
+          </a:ln>
+        </p:spPr>
+        <p:style>
+          <a:lnRef idx="1">
+            <a:schemeClr val="accent1"/>
+          </a:lnRef>
+          <a:fillRef idx="0">
+            <a:schemeClr val="accent1"/>
+          </a:fillRef>
+          <a:effectRef idx="0">
+            <a:schemeClr val="accent1"/>
+          </a:effectRef>
+          <a:fontRef idx="minor">
+            <a:schemeClr val="tx1"/>
+          </a:fontRef>
+        </p:style>
+      </p:cxnSp>
+      <p:sp>
+        <p:nvSpPr>
+          <p:cNvPr id="43" name="Rectangle 42">
+            <a:extLst>
+              <a:ext uri="{FF2B5EF4-FFF2-40B4-BE49-F238E27FC236}">
+                <a16:creationId xmlns:a16="http://schemas.microsoft.com/office/drawing/2014/main" id="{241EEF01-A3C6-914C-A5D4-61A981CC2C6B}"/>
+              </a:ext>
+            </a:extLst>
+          </p:cNvPr>
+          <p:cNvSpPr/>
+          <p:nvPr/>
+        </p:nvSpPr>
+        <p:spPr>
+          <a:xfrm>
+            <a:off x="9312055" y="1177124"/>
+            <a:ext cx="590341" cy="513162"/>
+          </a:xfrm>
+          <a:prstGeom prst="rect">
+            <a:avLst/>
+          </a:prstGeom>
+          <a:solidFill>
+            <a:schemeClr val="bg1">
+              <a:lumMod val="65000"/>
+            </a:schemeClr>
+          </a:solidFill>
           <a:ln w="63500">
             <a:solidFill>
-              <a:schemeClr val="tx1"/>
+              <a:schemeClr val="bg1">
+                <a:lumMod val="65000"/>
+              </a:schemeClr>
             </a:solidFill>
           </a:ln>
         </p:spPr>
@@ -4028,10 +4150,10 @@
       </p:sp>
       <p:sp>
         <p:nvSpPr>
-          <p:cNvPr id="26" name="TextBox 25">
-            <a:extLst>
-              <a:ext uri="{FF2B5EF4-FFF2-40B4-BE49-F238E27FC236}">
-                <a16:creationId xmlns:a16="http://schemas.microsoft.com/office/drawing/2014/main" id="{C87DAD9A-9E37-2B4A-A8D6-D7A818A0944A}"/>
+          <p:cNvPr id="44" name="TextBox 43">
+            <a:extLst>
+              <a:ext uri="{FF2B5EF4-FFF2-40B4-BE49-F238E27FC236}">
+                <a16:creationId xmlns:a16="http://schemas.microsoft.com/office/drawing/2014/main" id="{285F6682-16E2-C748-9042-1B2D8E9D6E0E}"/>
               </a:ext>
             </a:extLst>
           </p:cNvPr>
@@ -4040,8 +4162,8 @@
         </p:nvSpPr>
         <p:spPr>
           <a:xfrm>
-            <a:off x="9190878" y="2882778"/>
-            <a:ext cx="2834943" cy="369332"/>
+            <a:off x="8031747" y="648036"/>
+            <a:ext cx="2763321" cy="369332"/>
           </a:xfrm>
           <a:prstGeom prst="rect">
             <a:avLst/>
@@ -4049,81 +4171,62 @@
           <a:noFill/>
         </p:spPr>
         <p:txBody>
-          <a:bodyPr wrap="square" rtlCol="0">
+          <a:bodyPr wrap="none" rtlCol="0">
             <a:spAutoFit/>
           </a:bodyPr>
           <a:lstStyle/>
           <a:p>
             <a:r>
-              <a:rPr lang="en-CH" b="1" dirty="0"/>
-              <a:t>Client</a:t>
-            </a:r>
-            <a:r>
-              <a:rPr lang="en-CH" dirty="0"/>
-              <a:t> ws events manager</a:t>
-            </a:r>
-          </a:p>
-        </p:txBody>
-      </p:sp>
-      <p:sp>
-        <p:nvSpPr>
-          <p:cNvPr id="27" name="TextBox 26">
-            <a:extLst>
-              <a:ext uri="{FF2B5EF4-FFF2-40B4-BE49-F238E27FC236}">
-                <a16:creationId xmlns:a16="http://schemas.microsoft.com/office/drawing/2014/main" id="{20B5E63F-0EC3-BF48-BFF4-C452D3A3F34F}"/>
-              </a:ext>
-            </a:extLst>
-          </p:cNvPr>
-          <p:cNvSpPr txBox="1"/>
-          <p:nvPr/>
-        </p:nvSpPr>
-        <p:spPr>
-          <a:xfrm>
-            <a:off x="8393603" y="6387024"/>
-            <a:ext cx="3171463" cy="338554"/>
-          </a:xfrm>
-          <a:prstGeom prst="rect">
-            <a:avLst/>
-          </a:prstGeom>
-          <a:noFill/>
-        </p:spPr>
-        <p:txBody>
-          <a:bodyPr wrap="square" rtlCol="0">
-            <a:spAutoFit/>
-          </a:bodyPr>
-          <a:lstStyle/>
-          <a:p>
-            <a:r>
-              <a:rPr lang="en-CH" sz="1600" baseline="30000" dirty="0"/>
-              <a:t>*</a:t>
-            </a:r>
-            <a:r>
-              <a:rPr lang="en-CH" sz="1600" dirty="0"/>
-              <a:t>There may be multiple clients</a:t>
-            </a:r>
-            <a:endParaRPr lang="en-CH" sz="1600" baseline="30000" dirty="0"/>
+              <a:rPr lang="en-GB" dirty="0">
+                <a:solidFill>
+                  <a:schemeClr val="bg1">
+                    <a:lumMod val="65000"/>
+                  </a:schemeClr>
+                </a:solidFill>
+              </a:rPr>
+              <a:t>s</a:t>
+            </a:r>
+            <a:r>
+              <a:rPr lang="en-CH" dirty="0">
+                <a:solidFill>
+                  <a:schemeClr val="bg1">
+                    <a:lumMod val="65000"/>
+                  </a:schemeClr>
+                </a:solidFill>
+              </a:rPr>
+              <a:t>rv/shiny-server/</a:t>
+            </a:r>
+            <a:r>
+              <a:rPr lang="en-CH" b="1" dirty="0">
+                <a:solidFill>
+                  <a:schemeClr val="bg1">
+                    <a:lumMod val="65000"/>
+                  </a:schemeClr>
+                </a:solidFill>
+              </a:rPr>
+              <a:t>APP_PATH</a:t>
+            </a:r>
           </a:p>
         </p:txBody>
       </p:sp>
       <p:cxnSp>
         <p:nvCxnSpPr>
-          <p:cNvPr id="37" name="Straight Arrow Connector 36">
-            <a:extLst>
-              <a:ext uri="{FF2B5EF4-FFF2-40B4-BE49-F238E27FC236}">
-                <a16:creationId xmlns:a16="http://schemas.microsoft.com/office/drawing/2014/main" id="{45C40254-4B52-5749-8AB1-1801BFD42F81}"/>
+          <p:cNvPr id="45" name="Straight Arrow Connector 44">
+            <a:extLst>
+              <a:ext uri="{FF2B5EF4-FFF2-40B4-BE49-F238E27FC236}">
+                <a16:creationId xmlns:a16="http://schemas.microsoft.com/office/drawing/2014/main" id="{AFBAA076-74D7-4F46-9C83-E3202DC46C87}"/>
               </a:ext>
             </a:extLst>
           </p:cNvPr>
           <p:cNvCxnSpPr>
             <a:cxnSpLocks/>
-            <a:endCxn id="16" idx="3"/>
           </p:cNvCxnSpPr>
           <p:nvPr/>
         </p:nvCxnSpPr>
         <p:spPr>
-          <a:xfrm flipH="1" flipV="1">
-            <a:off x="7045260" y="1694021"/>
-            <a:ext cx="964962" cy="1956"/>
+          <a:xfrm>
+            <a:off x="9664790" y="1764131"/>
+            <a:ext cx="0" cy="431184"/>
           </a:xfrm>
           <a:prstGeom prst="straightConnector1">
             <a:avLst/>
@@ -4155,10 +4258,10 @@
       </p:cxnSp>
       <p:sp>
         <p:nvSpPr>
-          <p:cNvPr id="38" name="TextBox 37">
-            <a:extLst>
-              <a:ext uri="{FF2B5EF4-FFF2-40B4-BE49-F238E27FC236}">
-                <a16:creationId xmlns:a16="http://schemas.microsoft.com/office/drawing/2014/main" id="{4B1E7141-F137-4944-939C-526496DD18ED}"/>
+          <p:cNvPr id="46" name="TextBox 45">
+            <a:extLst>
+              <a:ext uri="{FF2B5EF4-FFF2-40B4-BE49-F238E27FC236}">
+                <a16:creationId xmlns:a16="http://schemas.microsoft.com/office/drawing/2014/main" id="{66A954B4-EDAA-7644-954B-94E6245F88B9}"/>
               </a:ext>
             </a:extLst>
           </p:cNvPr>
@@ -4167,8 +4270,8 @@
         </p:nvSpPr>
         <p:spPr>
           <a:xfrm>
-            <a:off x="7481569" y="966241"/>
-            <a:ext cx="1749280" cy="646331"/>
+            <a:off x="8864442" y="1923860"/>
+            <a:ext cx="734494" cy="307777"/>
           </a:xfrm>
           <a:prstGeom prst="rect">
             <a:avLst/>
@@ -4182,24 +4285,183 @@
           <a:lstStyle/>
           <a:p>
             <a:r>
-              <a:rPr lang="en-CH" dirty="0">
+              <a:rPr lang="en-CH" sz="1400" dirty="0">
                 <a:solidFill>
                   <a:schemeClr val="bg1">
                     <a:lumMod val="65000"/>
                   </a:schemeClr>
                 </a:solidFill>
               </a:rPr>
-              <a:t>Client browse to app url</a:t>
+              <a:t>runApp</a:t>
+            </a:r>
+          </a:p>
+        </p:txBody>
+      </p:sp>
+      <p:sp>
+        <p:nvSpPr>
+          <p:cNvPr id="47" name="Rectangle 46">
+            <a:extLst>
+              <a:ext uri="{FF2B5EF4-FFF2-40B4-BE49-F238E27FC236}">
+                <a16:creationId xmlns:a16="http://schemas.microsoft.com/office/drawing/2014/main" id="{C9441A47-B2F1-DA41-AD6D-ADBA3F7EDA10}"/>
+              </a:ext>
+            </a:extLst>
+          </p:cNvPr>
+          <p:cNvSpPr/>
+          <p:nvPr/>
+        </p:nvSpPr>
+        <p:spPr>
+          <a:xfrm>
+            <a:off x="101406" y="868282"/>
+            <a:ext cx="3541611" cy="307777"/>
+          </a:xfrm>
+          <a:prstGeom prst="rect">
+            <a:avLst/>
+          </a:prstGeom>
+        </p:spPr>
+        <p:txBody>
+          <a:bodyPr wrap="none">
+            <a:spAutoFit/>
+          </a:bodyPr>
+          <a:lstStyle/>
+          <a:p>
+            <a:r>
+              <a:rPr lang="en-CH" sz="1400" dirty="0"/>
+              <a:t>http(s)://&lt;HOSTNAME&gt;:&lt;PORT&gt;/&lt;</a:t>
+            </a:r>
+            <a:r>
+              <a:rPr lang="en-CH" sz="1400" b="1" dirty="0"/>
+              <a:t>APP_PATH</a:t>
+            </a:r>
+            <a:r>
+              <a:rPr lang="en-CH" sz="1400" dirty="0"/>
+              <a:t>&gt;</a:t>
+            </a:r>
+          </a:p>
+        </p:txBody>
+      </p:sp>
+      <p:sp>
+        <p:nvSpPr>
+          <p:cNvPr id="48" name="TextBox 47">
+            <a:extLst>
+              <a:ext uri="{FF2B5EF4-FFF2-40B4-BE49-F238E27FC236}">
+                <a16:creationId xmlns:a16="http://schemas.microsoft.com/office/drawing/2014/main" id="{7B28255D-E83D-BC40-BCA4-329F18BE0626}"/>
+              </a:ext>
+            </a:extLst>
+          </p:cNvPr>
+          <p:cNvSpPr txBox="1"/>
+          <p:nvPr/>
+        </p:nvSpPr>
+        <p:spPr>
+          <a:xfrm>
+            <a:off x="2569153" y="1216679"/>
+            <a:ext cx="665235" cy="369332"/>
+          </a:xfrm>
+          <a:prstGeom prst="rect">
+            <a:avLst/>
+          </a:prstGeom>
+          <a:noFill/>
+        </p:spPr>
+        <p:txBody>
+          <a:bodyPr wrap="square" rtlCol="0">
+            <a:spAutoFit/>
+          </a:bodyPr>
+          <a:lstStyle/>
+          <a:p>
+            <a:r>
+              <a:rPr lang="en-CH" b="1" dirty="0">
+                <a:solidFill>
+                  <a:srgbClr val="0070C0"/>
+                </a:solidFill>
+              </a:rPr>
+              <a:t>(1)</a:t>
+            </a:r>
+          </a:p>
+        </p:txBody>
+      </p:sp>
+      <p:sp>
+        <p:nvSpPr>
+          <p:cNvPr id="50" name="TextBox 49">
+            <a:extLst>
+              <a:ext uri="{FF2B5EF4-FFF2-40B4-BE49-F238E27FC236}">
+                <a16:creationId xmlns:a16="http://schemas.microsoft.com/office/drawing/2014/main" id="{C3DA0F36-F83B-3E45-9EDC-511DA568321E}"/>
+              </a:ext>
+            </a:extLst>
+          </p:cNvPr>
+          <p:cNvSpPr txBox="1"/>
+          <p:nvPr/>
+        </p:nvSpPr>
+        <p:spPr>
+          <a:xfrm>
+            <a:off x="8311594" y="2040757"/>
+            <a:ext cx="495710" cy="369332"/>
+          </a:xfrm>
+          <a:prstGeom prst="rect">
+            <a:avLst/>
+          </a:prstGeom>
+          <a:noFill/>
+        </p:spPr>
+        <p:txBody>
+          <a:bodyPr wrap="square" rtlCol="0">
+            <a:spAutoFit/>
+          </a:bodyPr>
+          <a:lstStyle/>
+          <a:p>
+            <a:r>
+              <a:rPr lang="en-CH" b="1" dirty="0">
+                <a:solidFill>
+                  <a:srgbClr val="0070C0"/>
+                </a:solidFill>
+              </a:rPr>
+              <a:t>(2)</a:t>
+            </a:r>
+          </a:p>
+        </p:txBody>
+      </p:sp>
+      <p:sp>
+        <p:nvSpPr>
+          <p:cNvPr id="52" name="TextBox 51">
+            <a:extLst>
+              <a:ext uri="{FF2B5EF4-FFF2-40B4-BE49-F238E27FC236}">
+                <a16:creationId xmlns:a16="http://schemas.microsoft.com/office/drawing/2014/main" id="{B04973AC-F9FD-5B4B-9C75-D5C3F2AF508F}"/>
+              </a:ext>
+            </a:extLst>
+          </p:cNvPr>
+          <p:cNvSpPr txBox="1"/>
+          <p:nvPr/>
+        </p:nvSpPr>
+        <p:spPr>
+          <a:xfrm>
+            <a:off x="831714" y="3231737"/>
+            <a:ext cx="665235" cy="369332"/>
+          </a:xfrm>
+          <a:prstGeom prst="rect">
+            <a:avLst/>
+          </a:prstGeom>
+          <a:noFill/>
+        </p:spPr>
+        <p:txBody>
+          <a:bodyPr wrap="square" rtlCol="0">
+            <a:spAutoFit/>
+          </a:bodyPr>
+          <a:lstStyle/>
+          <a:p>
+            <a:r>
+              <a:rPr lang="en-CH" b="1" dirty="0">
+                <a:solidFill>
+                  <a:srgbClr val="0070C0"/>
+                </a:solidFill>
+              </a:rPr>
+              <a:t>(*)</a:t>
             </a:r>
           </a:p>
         </p:txBody>
       </p:sp>
       <p:cxnSp>
         <p:nvCxnSpPr>
-          <p:cNvPr id="40" name="Straight Arrow Connector 39">
-            <a:extLst>
-              <a:ext uri="{FF2B5EF4-FFF2-40B4-BE49-F238E27FC236}">
-                <a16:creationId xmlns:a16="http://schemas.microsoft.com/office/drawing/2014/main" id="{A77E8004-EBFB-FC4C-AB2C-4D97C38F8FF9}"/>
+          <p:cNvPr id="53" name="Straight Arrow Connector 52">
+            <a:extLst>
+              <a:ext uri="{FF2B5EF4-FFF2-40B4-BE49-F238E27FC236}">
+                <a16:creationId xmlns:a16="http://schemas.microsoft.com/office/drawing/2014/main" id="{4E6FDBFA-283C-1648-9A9A-0AF011934533}"/>
               </a:ext>
             </a:extLst>
           </p:cNvPr>
@@ -4209,9 +4471,9 @@
           <p:nvPr/>
         </p:nvCxnSpPr>
         <p:spPr>
-          <a:xfrm>
-            <a:off x="9961580" y="2476144"/>
-            <a:ext cx="0" cy="452178"/>
+          <a:xfrm flipH="1" flipV="1">
+            <a:off x="5083301" y="2588916"/>
+            <a:ext cx="1368558" cy="181160"/>
           </a:xfrm>
           <a:prstGeom prst="straightConnector1">
             <a:avLst/>
@@ -4243,10 +4505,10 @@
       </p:cxnSp>
       <p:sp>
         <p:nvSpPr>
-          <p:cNvPr id="43" name="Rectangle 42">
-            <a:extLst>
-              <a:ext uri="{FF2B5EF4-FFF2-40B4-BE49-F238E27FC236}">
-                <a16:creationId xmlns:a16="http://schemas.microsoft.com/office/drawing/2014/main" id="{241EEF01-A3C6-914C-A5D4-61A981CC2C6B}"/>
+          <p:cNvPr id="60" name="Rectangle 59">
+            <a:extLst>
+              <a:ext uri="{FF2B5EF4-FFF2-40B4-BE49-F238E27FC236}">
+                <a16:creationId xmlns:a16="http://schemas.microsoft.com/office/drawing/2014/main" id="{866D73C8-573B-444B-A465-F14A93436668}"/>
               </a:ext>
             </a:extLst>
           </p:cNvPr>
@@ -4255,21 +4517,23 @@
         </p:nvSpPr>
         <p:spPr>
           <a:xfrm>
-            <a:off x="2061660" y="1241009"/>
+            <a:off x="8436609" y="1182007"/>
             <a:ext cx="590341" cy="513162"/>
           </a:xfrm>
           <a:prstGeom prst="rect">
             <a:avLst/>
           </a:prstGeom>
           <a:solidFill>
-            <a:schemeClr val="bg1">
-              <a:lumMod val="65000"/>
+            <a:schemeClr val="tx1">
+              <a:lumMod val="75000"/>
+              <a:lumOff val="25000"/>
             </a:schemeClr>
           </a:solidFill>
           <a:ln w="63500">
             <a:solidFill>
-              <a:schemeClr val="bg1">
-                <a:lumMod val="65000"/>
+              <a:schemeClr val="tx1">
+                <a:lumMod val="75000"/>
+                <a:lumOff val="25000"/>
               </a:schemeClr>
             </a:solidFill>
           </a:ln>
@@ -4295,16 +4559,90 @@
           <a:lstStyle/>
           <a:p>
             <a:pPr algn="ctr"/>
-            <a:endParaRPr lang="en-CH"/>
-          </a:p>
-        </p:txBody>
-      </p:sp>
-      <p:sp>
-        <p:nvSpPr>
-          <p:cNvPr id="44" name="TextBox 43">
-            <a:extLst>
-              <a:ext uri="{FF2B5EF4-FFF2-40B4-BE49-F238E27FC236}">
-                <a16:creationId xmlns:a16="http://schemas.microsoft.com/office/drawing/2014/main" id="{285F6682-16E2-C748-9042-1B2D8E9D6E0E}"/>
+            <a:endParaRPr lang="en-CH">
+              <a:solidFill>
+                <a:schemeClr val="tx1">
+                  <a:lumMod val="65000"/>
+                  <a:lumOff val="35000"/>
+                </a:schemeClr>
+              </a:solidFill>
+            </a:endParaRPr>
+          </a:p>
+        </p:txBody>
+      </p:sp>
+      <p:sp>
+        <p:nvSpPr>
+          <p:cNvPr id="61" name="Rectangle 60">
+            <a:extLst>
+              <a:ext uri="{FF2B5EF4-FFF2-40B4-BE49-F238E27FC236}">
+                <a16:creationId xmlns:a16="http://schemas.microsoft.com/office/drawing/2014/main" id="{EF78AC9C-D2BC-3447-A221-4CF4FFD09500}"/>
+              </a:ext>
+            </a:extLst>
+          </p:cNvPr>
+          <p:cNvSpPr/>
+          <p:nvPr/>
+        </p:nvSpPr>
+        <p:spPr>
+          <a:xfrm>
+            <a:off x="7575729" y="1180566"/>
+            <a:ext cx="590341" cy="513162"/>
+          </a:xfrm>
+          <a:prstGeom prst="rect">
+            <a:avLst/>
+          </a:prstGeom>
+          <a:solidFill>
+            <a:schemeClr val="tx1">
+              <a:lumMod val="75000"/>
+              <a:lumOff val="25000"/>
+            </a:schemeClr>
+          </a:solidFill>
+          <a:ln w="63500">
+            <a:solidFill>
+              <a:schemeClr val="tx1">
+                <a:lumMod val="75000"/>
+                <a:lumOff val="25000"/>
+              </a:schemeClr>
+            </a:solidFill>
+          </a:ln>
+        </p:spPr>
+        <p:style>
+          <a:lnRef idx="2">
+            <a:schemeClr val="accent1">
+              <a:shade val="50000"/>
+            </a:schemeClr>
+          </a:lnRef>
+          <a:fillRef idx="1">
+            <a:schemeClr val="accent1"/>
+          </a:fillRef>
+          <a:effectRef idx="0">
+            <a:schemeClr val="accent1"/>
+          </a:effectRef>
+          <a:fontRef idx="minor">
+            <a:schemeClr val="lt1"/>
+          </a:fontRef>
+        </p:style>
+        <p:txBody>
+          <a:bodyPr rtlCol="0" anchor="ctr"/>
+          <a:lstStyle/>
+          <a:p>
+            <a:pPr algn="ctr"/>
+            <a:endParaRPr lang="en-CH">
+              <a:solidFill>
+                <a:schemeClr val="tx1">
+                  <a:lumMod val="65000"/>
+                  <a:lumOff val="35000"/>
+                </a:schemeClr>
+              </a:solidFill>
+            </a:endParaRPr>
+          </a:p>
+        </p:txBody>
+      </p:sp>
+      <p:sp>
+        <p:nvSpPr>
+          <p:cNvPr id="63" name="TextBox 62">
+            <a:extLst>
+              <a:ext uri="{FF2B5EF4-FFF2-40B4-BE49-F238E27FC236}">
+                <a16:creationId xmlns:a16="http://schemas.microsoft.com/office/drawing/2014/main" id="{36C16596-DB10-474B-912B-D5980D030DD6}"/>
               </a:ext>
             </a:extLst>
           </p:cNvPr>
@@ -4313,8 +4651,8 @@
         </p:nvSpPr>
         <p:spPr>
           <a:xfrm>
-            <a:off x="2781800" y="804712"/>
-            <a:ext cx="1706942" cy="369332"/>
+            <a:off x="207746" y="179156"/>
+            <a:ext cx="2446888" cy="369332"/>
           </a:xfrm>
           <a:prstGeom prst="rect">
             <a:avLst/>
@@ -4328,37 +4666,419 @@
           <a:lstStyle/>
           <a:p>
             <a:r>
-              <a:rPr lang="en-CH" dirty="0">
+              <a:rPr lang="en-CH" dirty="0"/>
+              <a:t>Client 1</a:t>
+            </a:r>
+            <a:r>
+              <a:rPr lang="en-CH" baseline="30000" dirty="0"/>
+              <a:t>** </a:t>
+            </a:r>
+            <a:r>
+              <a:rPr lang="en-CH" dirty="0"/>
+              <a:t>(web browser)</a:t>
+            </a:r>
+          </a:p>
+        </p:txBody>
+      </p:sp>
+      <p:sp>
+        <p:nvSpPr>
+          <p:cNvPr id="64" name="Rectangle 63">
+            <a:extLst>
+              <a:ext uri="{FF2B5EF4-FFF2-40B4-BE49-F238E27FC236}">
+                <a16:creationId xmlns:a16="http://schemas.microsoft.com/office/drawing/2014/main" id="{28080729-9465-F54E-9829-3C69C367781B}"/>
+              </a:ext>
+            </a:extLst>
+          </p:cNvPr>
+          <p:cNvSpPr/>
+          <p:nvPr/>
+        </p:nvSpPr>
+        <p:spPr>
+          <a:xfrm>
+            <a:off x="7404675" y="1064671"/>
+            <a:ext cx="2611734" cy="810389"/>
+          </a:xfrm>
+          <a:prstGeom prst="rect">
+            <a:avLst/>
+          </a:prstGeom>
+          <a:noFill/>
+          <a:ln w="63500">
+            <a:solidFill>
+              <a:schemeClr val="tx1">
+                <a:lumMod val="95000"/>
+                <a:lumOff val="5000"/>
+              </a:schemeClr>
+            </a:solidFill>
+            <a:prstDash val="sysDash"/>
+          </a:ln>
+        </p:spPr>
+        <p:style>
+          <a:lnRef idx="2">
+            <a:schemeClr val="accent1">
+              <a:shade val="50000"/>
+            </a:schemeClr>
+          </a:lnRef>
+          <a:fillRef idx="1">
+            <a:schemeClr val="accent1"/>
+          </a:fillRef>
+          <a:effectRef idx="0">
+            <a:schemeClr val="accent1"/>
+          </a:effectRef>
+          <a:fontRef idx="minor">
+            <a:schemeClr val="lt1"/>
+          </a:fontRef>
+        </p:style>
+        <p:txBody>
+          <a:bodyPr rtlCol="0" anchor="ctr"/>
+          <a:lstStyle/>
+          <a:p>
+            <a:pPr algn="ctr"/>
+            <a:endParaRPr lang="en-CH" dirty="0">
+              <a:solidFill>
+                <a:schemeClr val="bg1">
+                  <a:lumMod val="65000"/>
+                </a:schemeClr>
+              </a:solidFill>
+            </a:endParaRPr>
+          </a:p>
+        </p:txBody>
+      </p:sp>
+      <p:sp>
+        <p:nvSpPr>
+          <p:cNvPr id="68" name="TextBox 67">
+            <a:extLst>
+              <a:ext uri="{FF2B5EF4-FFF2-40B4-BE49-F238E27FC236}">
+                <a16:creationId xmlns:a16="http://schemas.microsoft.com/office/drawing/2014/main" id="{2691C810-822D-7342-91B4-35801E89058C}"/>
+              </a:ext>
+            </a:extLst>
+          </p:cNvPr>
+          <p:cNvSpPr txBox="1"/>
+          <p:nvPr/>
+        </p:nvSpPr>
+        <p:spPr>
+          <a:xfrm>
+            <a:off x="2644159" y="2293717"/>
+            <a:ext cx="665235" cy="369332"/>
+          </a:xfrm>
+          <a:prstGeom prst="rect">
+            <a:avLst/>
+          </a:prstGeom>
+          <a:noFill/>
+        </p:spPr>
+        <p:txBody>
+          <a:bodyPr wrap="square" rtlCol="0">
+            <a:spAutoFit/>
+          </a:bodyPr>
+          <a:lstStyle/>
+          <a:p>
+            <a:r>
+              <a:rPr lang="en-CH" b="1" dirty="0">
                 <a:solidFill>
-                  <a:schemeClr val="bg1">
-                    <a:lumMod val="65000"/>
-                  </a:schemeClr>
+                  <a:srgbClr val="0070C0"/>
                 </a:solidFill>
               </a:rPr>
-              <a:t>Shiny app target</a:t>
-            </a:r>
+              <a:t>(4)</a:t>
+            </a:r>
+          </a:p>
+        </p:txBody>
+      </p:sp>
+      <p:sp>
+        <p:nvSpPr>
+          <p:cNvPr id="69" name="TextBox 68">
+            <a:extLst>
+              <a:ext uri="{FF2B5EF4-FFF2-40B4-BE49-F238E27FC236}">
+                <a16:creationId xmlns:a16="http://schemas.microsoft.com/office/drawing/2014/main" id="{B57E8E33-6DF0-2345-A9C8-84C39648C05A}"/>
+              </a:ext>
+            </a:extLst>
+          </p:cNvPr>
+          <p:cNvSpPr txBox="1"/>
+          <p:nvPr/>
+        </p:nvSpPr>
+        <p:spPr>
+          <a:xfrm>
+            <a:off x="617753" y="2222651"/>
+            <a:ext cx="1758392" cy="923330"/>
+          </a:xfrm>
+          <a:prstGeom prst="rect">
+            <a:avLst/>
+          </a:prstGeom>
+          <a:noFill/>
+        </p:spPr>
+        <p:txBody>
+          <a:bodyPr wrap="square" rtlCol="0">
+            <a:spAutoFit/>
+          </a:bodyPr>
+          <a:lstStyle/>
+          <a:p>
+            <a:r>
+              <a:rPr lang="en-CH" b="1" dirty="0"/>
+              <a:t>Rendered HTML page (translated ui.R into HTML)</a:t>
+            </a:r>
+          </a:p>
+        </p:txBody>
+      </p:sp>
+      <p:sp>
+        <p:nvSpPr>
+          <p:cNvPr id="6" name="Rectangle 5">
+            <a:extLst>
+              <a:ext uri="{FF2B5EF4-FFF2-40B4-BE49-F238E27FC236}">
+                <a16:creationId xmlns:a16="http://schemas.microsoft.com/office/drawing/2014/main" id="{1CEE022B-DDC6-D64E-A426-3391AF271B5B}"/>
+              </a:ext>
+            </a:extLst>
+          </p:cNvPr>
+          <p:cNvSpPr/>
+          <p:nvPr/>
+        </p:nvSpPr>
+        <p:spPr>
+          <a:xfrm>
+            <a:off x="10285599" y="2275557"/>
+            <a:ext cx="1363963" cy="307777"/>
+          </a:xfrm>
+          <a:prstGeom prst="rect">
+            <a:avLst/>
+          </a:prstGeom>
+        </p:spPr>
+        <p:txBody>
+          <a:bodyPr wrap="none">
+            <a:spAutoFit/>
+          </a:bodyPr>
+          <a:lstStyle/>
+          <a:p>
+            <a:r>
+              <a:rPr lang="en-CH" sz="1400" b="1" dirty="0"/>
+              <a:t>uiHttpHandler()</a:t>
+            </a:r>
+          </a:p>
+        </p:txBody>
+      </p:sp>
+      <p:sp>
+        <p:nvSpPr>
+          <p:cNvPr id="17" name="TextBox 16">
+            <a:extLst>
+              <a:ext uri="{FF2B5EF4-FFF2-40B4-BE49-F238E27FC236}">
+                <a16:creationId xmlns:a16="http://schemas.microsoft.com/office/drawing/2014/main" id="{8967C8DB-59BF-1C42-8B3D-3ABFE8AD1ACD}"/>
+              </a:ext>
+            </a:extLst>
+          </p:cNvPr>
+          <p:cNvSpPr txBox="1"/>
+          <p:nvPr/>
+        </p:nvSpPr>
+        <p:spPr>
+          <a:xfrm>
+            <a:off x="9198004" y="1216679"/>
+            <a:ext cx="975948" cy="461665"/>
+          </a:xfrm>
+          <a:prstGeom prst="rect">
+            <a:avLst/>
+          </a:prstGeom>
+          <a:noFill/>
+        </p:spPr>
+        <p:txBody>
+          <a:bodyPr wrap="square" rtlCol="0">
+            <a:spAutoFit/>
+          </a:bodyPr>
+          <a:lstStyle/>
+          <a:p>
+            <a:pPr marL="285750" indent="-285750">
+              <a:buFont typeface="Arial" panose="020B0604020202020204" pitchFamily="34" charset="0"/>
+              <a:buChar char="•"/>
+            </a:pPr>
+            <a:r>
+              <a:rPr lang="en-GB" sz="1200" b="1" dirty="0" err="1"/>
+              <a:t>ui</a:t>
+            </a:r>
+            <a:endParaRPr lang="en-GB" sz="1200" b="1" dirty="0"/>
+          </a:p>
+          <a:p>
+            <a:pPr marL="285750" indent="-285750">
+              <a:buFont typeface="Arial" panose="020B0604020202020204" pitchFamily="34" charset="0"/>
+              <a:buChar char="•"/>
+            </a:pPr>
+            <a:r>
+              <a:rPr lang="en-GB" sz="1200" b="1" dirty="0"/>
+              <a:t>server</a:t>
+            </a:r>
+            <a:endParaRPr lang="en-CH" sz="1200" b="1" dirty="0"/>
+          </a:p>
+        </p:txBody>
+      </p:sp>
+      <p:sp>
+        <p:nvSpPr>
+          <p:cNvPr id="55" name="Rectangle 54">
+            <a:extLst>
+              <a:ext uri="{FF2B5EF4-FFF2-40B4-BE49-F238E27FC236}">
+                <a16:creationId xmlns:a16="http://schemas.microsoft.com/office/drawing/2014/main" id="{4B167DC6-AD1E-464F-84ED-D08E590846A1}"/>
+              </a:ext>
+            </a:extLst>
+          </p:cNvPr>
+          <p:cNvSpPr/>
+          <p:nvPr/>
+        </p:nvSpPr>
+        <p:spPr>
+          <a:xfrm>
+            <a:off x="8132805" y="2572350"/>
+            <a:ext cx="3673827" cy="3178154"/>
+          </a:xfrm>
+          <a:prstGeom prst="rect">
+            <a:avLst/>
+          </a:prstGeom>
+          <a:noFill/>
+          <a:ln w="63500">
+            <a:solidFill>
+              <a:schemeClr val="tx1"/>
+            </a:solidFill>
+          </a:ln>
+        </p:spPr>
+        <p:style>
+          <a:lnRef idx="2">
+            <a:schemeClr val="accent1">
+              <a:shade val="50000"/>
+            </a:schemeClr>
+          </a:lnRef>
+          <a:fillRef idx="1">
+            <a:schemeClr val="accent1"/>
+          </a:fillRef>
+          <a:effectRef idx="0">
+            <a:schemeClr val="accent1"/>
+          </a:effectRef>
+          <a:fontRef idx="minor">
+            <a:schemeClr val="lt1"/>
+          </a:fontRef>
+        </p:style>
+        <p:txBody>
+          <a:bodyPr rtlCol="0" anchor="ctr"/>
+          <a:lstStyle/>
+          <a:p>
+            <a:pPr algn="ctr"/>
+            <a:endParaRPr lang="en-CH"/>
+          </a:p>
+        </p:txBody>
+      </p:sp>
+      <p:sp>
+        <p:nvSpPr>
+          <p:cNvPr id="62" name="Rectangle 61">
+            <a:extLst>
+              <a:ext uri="{FF2B5EF4-FFF2-40B4-BE49-F238E27FC236}">
+                <a16:creationId xmlns:a16="http://schemas.microsoft.com/office/drawing/2014/main" id="{F3FCB0F1-8DB3-E140-8E35-2A9B8729C68E}"/>
+              </a:ext>
+            </a:extLst>
+          </p:cNvPr>
+          <p:cNvSpPr/>
+          <p:nvPr/>
+        </p:nvSpPr>
+        <p:spPr>
+          <a:xfrm>
+            <a:off x="5649871" y="3093886"/>
+            <a:ext cx="2170050" cy="3432043"/>
+          </a:xfrm>
+          <a:prstGeom prst="rect">
+            <a:avLst/>
+          </a:prstGeom>
+          <a:noFill/>
+          <a:ln w="63500">
+            <a:solidFill>
+              <a:schemeClr val="tx1"/>
+            </a:solidFill>
+          </a:ln>
+        </p:spPr>
+        <p:style>
+          <a:lnRef idx="2">
+            <a:schemeClr val="accent1">
+              <a:shade val="50000"/>
+            </a:schemeClr>
+          </a:lnRef>
+          <a:fillRef idx="1">
+            <a:schemeClr val="accent1"/>
+          </a:fillRef>
+          <a:effectRef idx="0">
+            <a:schemeClr val="accent1"/>
+          </a:effectRef>
+          <a:fontRef idx="minor">
+            <a:schemeClr val="lt1"/>
+          </a:fontRef>
+        </p:style>
+        <p:txBody>
+          <a:bodyPr rtlCol="0" anchor="ctr"/>
+          <a:lstStyle/>
+          <a:p>
+            <a:pPr algn="ctr"/>
+            <a:endParaRPr lang="en-CH"/>
+          </a:p>
+        </p:txBody>
+      </p:sp>
+      <p:sp>
+        <p:nvSpPr>
+          <p:cNvPr id="70" name="TextBox 69">
+            <a:extLst>
+              <a:ext uri="{FF2B5EF4-FFF2-40B4-BE49-F238E27FC236}">
+                <a16:creationId xmlns:a16="http://schemas.microsoft.com/office/drawing/2014/main" id="{5F168626-D390-9A49-B34B-7E76A142CEB3}"/>
+              </a:ext>
+            </a:extLst>
+          </p:cNvPr>
+          <p:cNvSpPr txBox="1"/>
+          <p:nvPr/>
+        </p:nvSpPr>
+        <p:spPr>
+          <a:xfrm>
+            <a:off x="5656506" y="2740796"/>
+            <a:ext cx="2139751" cy="307777"/>
+          </a:xfrm>
+          <a:prstGeom prst="rect">
+            <a:avLst/>
+          </a:prstGeom>
+          <a:noFill/>
+        </p:spPr>
+        <p:txBody>
+          <a:bodyPr wrap="square" rtlCol="0">
+            <a:spAutoFit/>
+          </a:bodyPr>
+          <a:lstStyle/>
+          <a:p>
+            <a:r>
+              <a:rPr lang="de-CH" sz="1400" dirty="0"/>
+              <a:t>{</a:t>
+            </a:r>
+            <a:r>
+              <a:rPr lang="de-CH" sz="1400" dirty="0" err="1"/>
+              <a:t>httpuv</a:t>
+            </a:r>
+            <a:r>
+              <a:rPr lang="de-CH" sz="1400" dirty="0"/>
+              <a:t>} </a:t>
+            </a:r>
+            <a:r>
+              <a:rPr lang="de-CH" sz="1400" dirty="0" err="1"/>
+              <a:t>layer</a:t>
+            </a:r>
+            <a:r>
+              <a:rPr lang="de-CH" sz="1400" dirty="0"/>
+              <a:t>: HTTP </a:t>
+            </a:r>
+            <a:r>
+              <a:rPr lang="de-CH" sz="1400" dirty="0" err="1"/>
+              <a:t>server</a:t>
+            </a:r>
+            <a:endParaRPr lang="en-CH" sz="1400" dirty="0"/>
           </a:p>
         </p:txBody>
       </p:sp>
       <p:cxnSp>
         <p:nvCxnSpPr>
-          <p:cNvPr id="45" name="Straight Arrow Connector 44">
-            <a:extLst>
-              <a:ext uri="{FF2B5EF4-FFF2-40B4-BE49-F238E27FC236}">
-                <a16:creationId xmlns:a16="http://schemas.microsoft.com/office/drawing/2014/main" id="{AFBAA076-74D7-4F46-9C83-E3202DC46C87}"/>
+          <p:cNvPr id="72" name="Straight Arrow Connector 71">
+            <a:extLst>
+              <a:ext uri="{FF2B5EF4-FFF2-40B4-BE49-F238E27FC236}">
+                <a16:creationId xmlns:a16="http://schemas.microsoft.com/office/drawing/2014/main" id="{74458F06-8D87-D54D-BC5B-F396FE15FF60}"/>
               </a:ext>
             </a:extLst>
           </p:cNvPr>
           <p:cNvCxnSpPr>
             <a:cxnSpLocks/>
-            <a:endCxn id="16" idx="1"/>
           </p:cNvCxnSpPr>
           <p:nvPr/>
         </p:nvCxnSpPr>
         <p:spPr>
-          <a:xfrm>
-            <a:off x="2809057" y="1497889"/>
-            <a:ext cx="2334207" cy="196132"/>
+          <a:xfrm flipH="1">
+            <a:off x="2487909" y="2628990"/>
+            <a:ext cx="1178124" cy="241709"/>
           </a:xfrm>
           <a:prstGeom prst="straightConnector1">
             <a:avLst/>
@@ -4390,241 +5110,60 @@
       </p:cxnSp>
       <p:sp>
         <p:nvSpPr>
-          <p:cNvPr id="46" name="TextBox 45">
-            <a:extLst>
-              <a:ext uri="{FF2B5EF4-FFF2-40B4-BE49-F238E27FC236}">
-                <a16:creationId xmlns:a16="http://schemas.microsoft.com/office/drawing/2014/main" id="{66A954B4-EDAA-7644-954B-94E6245F88B9}"/>
-              </a:ext>
-            </a:extLst>
-          </p:cNvPr>
-          <p:cNvSpPr txBox="1"/>
+          <p:cNvPr id="28" name="Rectangle 27">
+            <a:extLst>
+              <a:ext uri="{FF2B5EF4-FFF2-40B4-BE49-F238E27FC236}">
+                <a16:creationId xmlns:a16="http://schemas.microsoft.com/office/drawing/2014/main" id="{0001641B-916F-2846-B4D4-4DBDFDD06D26}"/>
+              </a:ext>
+            </a:extLst>
+          </p:cNvPr>
+          <p:cNvSpPr/>
           <p:nvPr/>
         </p:nvSpPr>
         <p:spPr>
           <a:xfrm>
-            <a:off x="3521647" y="1207716"/>
-            <a:ext cx="1140960" cy="369332"/>
+            <a:off x="9217019" y="2249265"/>
+            <a:ext cx="975652" cy="307777"/>
           </a:xfrm>
           <a:prstGeom prst="rect">
             <a:avLst/>
           </a:prstGeom>
-          <a:noFill/>
-        </p:spPr>
-        <p:txBody>
-          <a:bodyPr wrap="square" rtlCol="0">
+        </p:spPr>
+        <p:txBody>
+          <a:bodyPr wrap="none">
             <a:spAutoFit/>
           </a:bodyPr>
           <a:lstStyle/>
           <a:p>
             <a:r>
-              <a:rPr lang="en-CH" dirty="0">
+              <a:rPr lang="en-GB" sz="1400" b="1" dirty="0">
                 <a:solidFill>
                   <a:schemeClr val="bg1">
                     <a:lumMod val="65000"/>
                   </a:schemeClr>
                 </a:solidFill>
               </a:rPr>
-              <a:t>runApp</a:t>
-            </a:r>
-          </a:p>
-        </p:txBody>
-      </p:sp>
-      <p:sp>
-        <p:nvSpPr>
-          <p:cNvPr id="47" name="Rectangle 46">
-            <a:extLst>
-              <a:ext uri="{FF2B5EF4-FFF2-40B4-BE49-F238E27FC236}">
-                <a16:creationId xmlns:a16="http://schemas.microsoft.com/office/drawing/2014/main" id="{C9441A47-B2F1-DA41-AD6D-ADBA3F7EDA10}"/>
-              </a:ext>
-            </a:extLst>
-          </p:cNvPr>
-          <p:cNvSpPr/>
-          <p:nvPr/>
-        </p:nvSpPr>
-        <p:spPr>
-          <a:xfrm>
-            <a:off x="4793474" y="210861"/>
-            <a:ext cx="2645083" cy="338554"/>
-          </a:xfrm>
-          <a:prstGeom prst="rect">
-            <a:avLst/>
-          </a:prstGeom>
-        </p:spPr>
-        <p:txBody>
-          <a:bodyPr wrap="none">
-            <a:spAutoFit/>
-          </a:bodyPr>
-          <a:lstStyle/>
-          <a:p>
-            <a:r>
-              <a:rPr lang="en-CH" sz="1600" dirty="0"/>
-              <a:t>http://&lt;HOSTNAME&gt;:&lt;PORT&gt;</a:t>
-            </a:r>
-          </a:p>
-        </p:txBody>
-      </p:sp>
-      <p:sp>
-        <p:nvSpPr>
-          <p:cNvPr id="48" name="TextBox 47">
-            <a:extLst>
-              <a:ext uri="{FF2B5EF4-FFF2-40B4-BE49-F238E27FC236}">
-                <a16:creationId xmlns:a16="http://schemas.microsoft.com/office/drawing/2014/main" id="{7B28255D-E83D-BC40-BCA4-329F18BE0626}"/>
-              </a:ext>
-            </a:extLst>
-          </p:cNvPr>
-          <p:cNvSpPr txBox="1"/>
-          <p:nvPr/>
-        </p:nvSpPr>
-        <p:spPr>
-          <a:xfrm>
-            <a:off x="7677604" y="724378"/>
-            <a:ext cx="665235" cy="369332"/>
-          </a:xfrm>
-          <a:prstGeom prst="rect">
-            <a:avLst/>
-          </a:prstGeom>
-          <a:noFill/>
-        </p:spPr>
-        <p:txBody>
-          <a:bodyPr wrap="square" rtlCol="0">
-            <a:spAutoFit/>
-          </a:bodyPr>
-          <a:lstStyle/>
-          <a:p>
-            <a:r>
-              <a:rPr lang="en-CH" b="1" dirty="0">
+              <a:t>u</a:t>
+            </a:r>
+            <a:r>
+              <a:rPr lang="en-CH" sz="1400" b="1" dirty="0">
                 <a:solidFill>
-                  <a:srgbClr val="0070C0"/>
+                  <a:schemeClr val="bg1">
+                    <a:lumMod val="65000"/>
+                  </a:schemeClr>
                 </a:solidFill>
               </a:rPr>
-              <a:t>(1)</a:t>
-            </a:r>
-          </a:p>
-        </p:txBody>
-      </p:sp>
-      <p:sp>
-        <p:nvSpPr>
-          <p:cNvPr id="49" name="TextBox 48">
-            <a:extLst>
-              <a:ext uri="{FF2B5EF4-FFF2-40B4-BE49-F238E27FC236}">
-                <a16:creationId xmlns:a16="http://schemas.microsoft.com/office/drawing/2014/main" id="{316446D8-B620-3E4D-834E-6891AA01B895}"/>
-              </a:ext>
-            </a:extLst>
-          </p:cNvPr>
-          <p:cNvSpPr txBox="1"/>
-          <p:nvPr/>
-        </p:nvSpPr>
-        <p:spPr>
-          <a:xfrm>
-            <a:off x="5914463" y="1374006"/>
-            <a:ext cx="665235" cy="369332"/>
-          </a:xfrm>
-          <a:prstGeom prst="rect">
-            <a:avLst/>
-          </a:prstGeom>
-          <a:noFill/>
-        </p:spPr>
-        <p:txBody>
-          <a:bodyPr wrap="square" rtlCol="0">
-            <a:spAutoFit/>
-          </a:bodyPr>
-          <a:lstStyle/>
-          <a:p>
-            <a:r>
-              <a:rPr lang="en-CH" b="1" dirty="0">
-                <a:solidFill>
-                  <a:srgbClr val="0070C0"/>
-                </a:solidFill>
-              </a:rPr>
-              <a:t>(2)</a:t>
-            </a:r>
-          </a:p>
-        </p:txBody>
-      </p:sp>
-      <p:sp>
-        <p:nvSpPr>
-          <p:cNvPr id="50" name="TextBox 49">
-            <a:extLst>
-              <a:ext uri="{FF2B5EF4-FFF2-40B4-BE49-F238E27FC236}">
-                <a16:creationId xmlns:a16="http://schemas.microsoft.com/office/drawing/2014/main" id="{C3DA0F36-F83B-3E45-9EDC-511DA568321E}"/>
-              </a:ext>
-            </a:extLst>
-          </p:cNvPr>
-          <p:cNvSpPr txBox="1"/>
-          <p:nvPr/>
-        </p:nvSpPr>
-        <p:spPr>
-          <a:xfrm>
-            <a:off x="3107769" y="1174323"/>
-            <a:ext cx="665235" cy="369332"/>
-          </a:xfrm>
-          <a:prstGeom prst="rect">
-            <a:avLst/>
-          </a:prstGeom>
-          <a:noFill/>
-        </p:spPr>
-        <p:txBody>
-          <a:bodyPr wrap="square" rtlCol="0">
-            <a:spAutoFit/>
-          </a:bodyPr>
-          <a:lstStyle/>
-          <a:p>
-            <a:r>
-              <a:rPr lang="en-CH" b="1" dirty="0">
-                <a:solidFill>
-                  <a:srgbClr val="0070C0"/>
-                </a:solidFill>
-              </a:rPr>
-              <a:t>(3)</a:t>
-            </a:r>
-          </a:p>
-        </p:txBody>
-      </p:sp>
-      <p:sp>
-        <p:nvSpPr>
-          <p:cNvPr id="52" name="TextBox 51">
-            <a:extLst>
-              <a:ext uri="{FF2B5EF4-FFF2-40B4-BE49-F238E27FC236}">
-                <a16:creationId xmlns:a16="http://schemas.microsoft.com/office/drawing/2014/main" id="{B04973AC-F9FD-5B4B-9C75-D5C3F2AF508F}"/>
-              </a:ext>
-            </a:extLst>
-          </p:cNvPr>
-          <p:cNvSpPr txBox="1"/>
-          <p:nvPr/>
-        </p:nvSpPr>
-        <p:spPr>
-          <a:xfrm>
-            <a:off x="9533744" y="2473818"/>
-            <a:ext cx="665235" cy="369332"/>
-          </a:xfrm>
-          <a:prstGeom prst="rect">
-            <a:avLst/>
-          </a:prstGeom>
-          <a:noFill/>
-        </p:spPr>
-        <p:txBody>
-          <a:bodyPr wrap="square" rtlCol="0">
-            <a:spAutoFit/>
-          </a:bodyPr>
-          <a:lstStyle/>
-          <a:p>
-            <a:r>
-              <a:rPr lang="en-CH" b="1" dirty="0">
-                <a:solidFill>
-                  <a:srgbClr val="0070C0"/>
-                </a:solidFill>
-              </a:rPr>
-              <a:t>(6)</a:t>
+              <a:t>i (R code)</a:t>
             </a:r>
           </a:p>
         </p:txBody>
       </p:sp>
       <p:cxnSp>
         <p:nvCxnSpPr>
-          <p:cNvPr id="53" name="Straight Arrow Connector 52">
-            <a:extLst>
-              <a:ext uri="{FF2B5EF4-FFF2-40B4-BE49-F238E27FC236}">
-                <a16:creationId xmlns:a16="http://schemas.microsoft.com/office/drawing/2014/main" id="{4E6FDBFA-283C-1648-9A9A-0AF011934533}"/>
+          <p:cNvPr id="73" name="Straight Arrow Connector 72">
+            <a:extLst>
+              <a:ext uri="{FF2B5EF4-FFF2-40B4-BE49-F238E27FC236}">
+                <a16:creationId xmlns:a16="http://schemas.microsoft.com/office/drawing/2014/main" id="{E01B14DA-EFB8-A34A-A862-B18C00ABE7D1}"/>
               </a:ext>
             </a:extLst>
           </p:cNvPr>
@@ -4635,8 +5174,778 @@
         </p:nvCxnSpPr>
         <p:spPr>
           <a:xfrm>
-            <a:off x="7066066" y="1898325"/>
-            <a:ext cx="1998961" cy="3953"/>
+            <a:off x="9734647" y="2738387"/>
+            <a:ext cx="0" cy="1120284"/>
+          </a:xfrm>
+          <a:prstGeom prst="straightConnector1">
+            <a:avLst/>
+          </a:prstGeom>
+          <a:ln w="38100">
+            <a:solidFill>
+              <a:schemeClr val="bg1">
+                <a:lumMod val="65000"/>
+              </a:schemeClr>
+            </a:solidFill>
+            <a:prstDash val="solid"/>
+            <a:tailEnd type="triangle"/>
+          </a:ln>
+        </p:spPr>
+        <p:style>
+          <a:lnRef idx="1">
+            <a:schemeClr val="accent1"/>
+          </a:lnRef>
+          <a:fillRef idx="0">
+            <a:schemeClr val="accent1"/>
+          </a:fillRef>
+          <a:effectRef idx="0">
+            <a:schemeClr val="accent1"/>
+          </a:effectRef>
+          <a:fontRef idx="minor">
+            <a:schemeClr val="tx1"/>
+          </a:fontRef>
+        </p:style>
+      </p:cxnSp>
+      <p:sp>
+        <p:nvSpPr>
+          <p:cNvPr id="31" name="Rectangle 30">
+            <a:extLst>
+              <a:ext uri="{FF2B5EF4-FFF2-40B4-BE49-F238E27FC236}">
+                <a16:creationId xmlns:a16="http://schemas.microsoft.com/office/drawing/2014/main" id="{2EBC9E56-ABB3-4847-9DA2-BB01DE7518D0}"/>
+              </a:ext>
+            </a:extLst>
+          </p:cNvPr>
+          <p:cNvSpPr/>
+          <p:nvPr/>
+        </p:nvSpPr>
+        <p:spPr>
+          <a:xfrm>
+            <a:off x="8348865" y="3255961"/>
+            <a:ext cx="1403506" cy="307777"/>
+          </a:xfrm>
+          <a:prstGeom prst="rect">
+            <a:avLst/>
+          </a:prstGeom>
+        </p:spPr>
+        <p:txBody>
+          <a:bodyPr wrap="square">
+            <a:spAutoFit/>
+          </a:bodyPr>
+          <a:lstStyle/>
+          <a:p>
+            <a:r>
+              <a:rPr lang="en-CH" sz="1400" b="1" dirty="0"/>
+              <a:t>htmlTemplate()</a:t>
+            </a:r>
+          </a:p>
+        </p:txBody>
+      </p:sp>
+      <p:sp>
+        <p:nvSpPr>
+          <p:cNvPr id="74" name="TextBox 73">
+            <a:extLst>
+              <a:ext uri="{FF2B5EF4-FFF2-40B4-BE49-F238E27FC236}">
+                <a16:creationId xmlns:a16="http://schemas.microsoft.com/office/drawing/2014/main" id="{C4D15F9C-0895-184E-9E00-D166BDE808E8}"/>
+              </a:ext>
+            </a:extLst>
+          </p:cNvPr>
+          <p:cNvSpPr txBox="1"/>
+          <p:nvPr/>
+        </p:nvSpPr>
+        <p:spPr>
+          <a:xfrm>
+            <a:off x="2164381" y="3264486"/>
+            <a:ext cx="1413992" cy="738664"/>
+          </a:xfrm>
+          <a:prstGeom prst="rect">
+            <a:avLst/>
+          </a:prstGeom>
+          <a:noFill/>
+        </p:spPr>
+        <p:txBody>
+          <a:bodyPr wrap="square" rtlCol="0">
+            <a:spAutoFit/>
+          </a:bodyPr>
+          <a:lstStyle/>
+          <a:p>
+            <a:r>
+              <a:rPr lang="en-GB" sz="1400" dirty="0">
+                <a:solidFill>
+                  <a:schemeClr val="bg1">
+                    <a:lumMod val="65000"/>
+                  </a:schemeClr>
+                </a:solidFill>
+              </a:rPr>
+              <a:t>C</a:t>
+            </a:r>
+            <a:r>
+              <a:rPr lang="en-CH" sz="1400" dirty="0">
+                <a:solidFill>
+                  <a:schemeClr val="bg1">
+                    <a:lumMod val="65000"/>
+                  </a:schemeClr>
+                </a:solidFill>
+              </a:rPr>
+              <a:t>lient browser receives the HTML document</a:t>
+            </a:r>
+          </a:p>
+        </p:txBody>
+      </p:sp>
+      <p:sp>
+        <p:nvSpPr>
+          <p:cNvPr id="36" name="Rectangle 35">
+            <a:extLst>
+              <a:ext uri="{FF2B5EF4-FFF2-40B4-BE49-F238E27FC236}">
+                <a16:creationId xmlns:a16="http://schemas.microsoft.com/office/drawing/2014/main" id="{E4B7E3DB-C19A-8944-B9A6-A16F7B012649}"/>
+              </a:ext>
+            </a:extLst>
+          </p:cNvPr>
+          <p:cNvSpPr/>
+          <p:nvPr/>
+        </p:nvSpPr>
+        <p:spPr>
+          <a:xfrm>
+            <a:off x="8390150" y="2766019"/>
+            <a:ext cx="1228093" cy="584775"/>
+          </a:xfrm>
+          <a:prstGeom prst="rect">
+            <a:avLst/>
+          </a:prstGeom>
+        </p:spPr>
+        <p:txBody>
+          <a:bodyPr wrap="none">
+            <a:spAutoFit/>
+          </a:bodyPr>
+          <a:lstStyle/>
+          <a:p>
+            <a:r>
+              <a:rPr lang="en-GB" sz="1400" b="1" dirty="0"/>
+              <a:t>t</a:t>
+            </a:r>
+            <a:r>
+              <a:rPr lang="en-CH" sz="1400" b="1" dirty="0"/>
+              <a:t>ags$body</a:t>
+            </a:r>
+            <a:r>
+              <a:rPr lang="en-CH" sz="1400" dirty="0"/>
+              <a:t>(…) </a:t>
+            </a:r>
+          </a:p>
+          <a:p>
+            <a:r>
+              <a:rPr lang="en-CH" dirty="0"/>
+              <a:t>        +</a:t>
+            </a:r>
+          </a:p>
+        </p:txBody>
+      </p:sp>
+      <p:sp>
+        <p:nvSpPr>
+          <p:cNvPr id="39" name="TextBox 38">
+            <a:extLst>
+              <a:ext uri="{FF2B5EF4-FFF2-40B4-BE49-F238E27FC236}">
+                <a16:creationId xmlns:a16="http://schemas.microsoft.com/office/drawing/2014/main" id="{D1F34968-B715-2D4B-AE07-6BE7A78D7139}"/>
+              </a:ext>
+            </a:extLst>
+          </p:cNvPr>
+          <p:cNvSpPr txBox="1"/>
+          <p:nvPr/>
+        </p:nvSpPr>
+        <p:spPr>
+          <a:xfrm>
+            <a:off x="8897191" y="3869348"/>
+            <a:ext cx="1715781" cy="307777"/>
+          </a:xfrm>
+          <a:prstGeom prst="rect">
+            <a:avLst/>
+          </a:prstGeom>
+          <a:noFill/>
+        </p:spPr>
+        <p:txBody>
+          <a:bodyPr wrap="square" rtlCol="0">
+            <a:spAutoFit/>
+          </a:bodyPr>
+          <a:lstStyle/>
+          <a:p>
+            <a:r>
+              <a:rPr lang="en-GB" sz="1400" dirty="0"/>
+              <a:t>V</a:t>
+            </a:r>
+            <a:r>
+              <a:rPr lang="en-CH" sz="1400" dirty="0"/>
+              <a:t>alid HTML template</a:t>
+            </a:r>
+          </a:p>
+        </p:txBody>
+      </p:sp>
+      <p:cxnSp>
+        <p:nvCxnSpPr>
+          <p:cNvPr id="75" name="Straight Arrow Connector 74">
+            <a:extLst>
+              <a:ext uri="{FF2B5EF4-FFF2-40B4-BE49-F238E27FC236}">
+                <a16:creationId xmlns:a16="http://schemas.microsoft.com/office/drawing/2014/main" id="{702E3325-B621-C34C-B770-A620B3059F4D}"/>
+              </a:ext>
+            </a:extLst>
+          </p:cNvPr>
+          <p:cNvCxnSpPr>
+            <a:cxnSpLocks/>
+          </p:cNvCxnSpPr>
+          <p:nvPr/>
+        </p:nvCxnSpPr>
+        <p:spPr>
+          <a:xfrm>
+            <a:off x="9755081" y="4190023"/>
+            <a:ext cx="0" cy="735604"/>
+          </a:xfrm>
+          <a:prstGeom prst="straightConnector1">
+            <a:avLst/>
+          </a:prstGeom>
+          <a:ln w="38100">
+            <a:solidFill>
+              <a:schemeClr val="bg1">
+                <a:lumMod val="65000"/>
+              </a:schemeClr>
+            </a:solidFill>
+            <a:prstDash val="solid"/>
+            <a:tailEnd type="triangle"/>
+          </a:ln>
+        </p:spPr>
+        <p:style>
+          <a:lnRef idx="1">
+            <a:schemeClr val="accent1"/>
+          </a:lnRef>
+          <a:fillRef idx="0">
+            <a:schemeClr val="accent1"/>
+          </a:fillRef>
+          <a:effectRef idx="0">
+            <a:schemeClr val="accent1"/>
+          </a:effectRef>
+          <a:fontRef idx="minor">
+            <a:schemeClr val="tx1"/>
+          </a:fontRef>
+        </p:style>
+      </p:cxnSp>
+      <p:sp>
+        <p:nvSpPr>
+          <p:cNvPr id="42" name="Rectangle 41">
+            <a:extLst>
+              <a:ext uri="{FF2B5EF4-FFF2-40B4-BE49-F238E27FC236}">
+                <a16:creationId xmlns:a16="http://schemas.microsoft.com/office/drawing/2014/main" id="{2FEDA512-DE51-AB4D-AB3E-FE54CF55DA94}"/>
+              </a:ext>
+            </a:extLst>
+          </p:cNvPr>
+          <p:cNvSpPr/>
+          <p:nvPr/>
+        </p:nvSpPr>
+        <p:spPr>
+          <a:xfrm>
+            <a:off x="8141043" y="4108737"/>
+            <a:ext cx="1587358" cy="830997"/>
+          </a:xfrm>
+          <a:prstGeom prst="rect">
+            <a:avLst/>
+          </a:prstGeom>
+        </p:spPr>
+        <p:txBody>
+          <a:bodyPr wrap="none">
+            <a:spAutoFit/>
+          </a:bodyPr>
+          <a:lstStyle/>
+          <a:p>
+            <a:r>
+              <a:rPr lang="en-CH" sz="1200" b="1" dirty="0"/>
+              <a:t>renderDocument()</a:t>
+            </a:r>
+          </a:p>
+          <a:p>
+            <a:r>
+              <a:rPr lang="en-CH" sz="1200" b="1" dirty="0"/>
+              <a:t>(renderTags, </a:t>
+            </a:r>
+          </a:p>
+          <a:p>
+            <a:r>
+              <a:rPr lang="en-CH" sz="1200" b="1" dirty="0"/>
+              <a:t>resolveDependencies,</a:t>
+            </a:r>
+          </a:p>
+          <a:p>
+            <a:r>
+              <a:rPr lang="en-CH" sz="1200" b="1" dirty="0"/>
+              <a:t>renderDependencies)</a:t>
+            </a:r>
+            <a:endParaRPr lang="en-CH" sz="1600" b="1" dirty="0"/>
+          </a:p>
+        </p:txBody>
+      </p:sp>
+      <p:sp>
+        <p:nvSpPr>
+          <p:cNvPr id="82" name="Rectangle 81">
+            <a:extLst>
+              <a:ext uri="{FF2B5EF4-FFF2-40B4-BE49-F238E27FC236}">
+                <a16:creationId xmlns:a16="http://schemas.microsoft.com/office/drawing/2014/main" id="{833BAA6E-C731-3744-8B5E-A06A0D6297CB}"/>
+              </a:ext>
+            </a:extLst>
+          </p:cNvPr>
+          <p:cNvSpPr/>
+          <p:nvPr/>
+        </p:nvSpPr>
+        <p:spPr>
+          <a:xfrm>
+            <a:off x="9853426" y="2797468"/>
+            <a:ext cx="1464421" cy="738664"/>
+          </a:xfrm>
+          <a:prstGeom prst="rect">
+            <a:avLst/>
+          </a:prstGeom>
+        </p:spPr>
+        <p:txBody>
+          <a:bodyPr wrap="square">
+            <a:spAutoFit/>
+          </a:bodyPr>
+          <a:lstStyle/>
+          <a:p>
+            <a:r>
+              <a:rPr lang="en-GB" sz="1400" dirty="0"/>
+              <a:t>A</a:t>
+            </a:r>
+            <a:r>
+              <a:rPr lang="en-CH" sz="1400" dirty="0"/>
+              <a:t>dds </a:t>
+            </a:r>
+            <a:r>
+              <a:rPr lang="en-GB" sz="1400" dirty="0"/>
+              <a:t>&lt;!DOCTYPE html&gt;, html, head and body</a:t>
+            </a:r>
+            <a:endParaRPr lang="en-CH" sz="1400" dirty="0"/>
+          </a:p>
+        </p:txBody>
+      </p:sp>
+      <p:sp>
+        <p:nvSpPr>
+          <p:cNvPr id="86" name="TextBox 85">
+            <a:extLst>
+              <a:ext uri="{FF2B5EF4-FFF2-40B4-BE49-F238E27FC236}">
+                <a16:creationId xmlns:a16="http://schemas.microsoft.com/office/drawing/2014/main" id="{EA517D50-3F9A-B94D-B78E-23004A8F340F}"/>
+              </a:ext>
+            </a:extLst>
+          </p:cNvPr>
+          <p:cNvSpPr txBox="1"/>
+          <p:nvPr/>
+        </p:nvSpPr>
+        <p:spPr>
+          <a:xfrm>
+            <a:off x="9762337" y="4131299"/>
+            <a:ext cx="2113016" cy="1015663"/>
+          </a:xfrm>
+          <a:prstGeom prst="rect">
+            <a:avLst/>
+          </a:prstGeom>
+          <a:noFill/>
+        </p:spPr>
+        <p:txBody>
+          <a:bodyPr wrap="square" rtlCol="0">
+            <a:spAutoFit/>
+          </a:bodyPr>
+          <a:lstStyle/>
+          <a:p>
+            <a:pPr marL="285750" indent="-285750">
+              <a:buFont typeface="Arial" panose="020B0604020202020204" pitchFamily="34" charset="0"/>
+              <a:buChar char="•"/>
+            </a:pPr>
+            <a:r>
+              <a:rPr lang="en-GB" sz="1200" dirty="0"/>
+              <a:t>C</a:t>
+            </a:r>
+            <a:r>
+              <a:rPr lang="en-CH" sz="1200" dirty="0"/>
+              <a:t>onvert R tags to HTML</a:t>
+            </a:r>
+          </a:p>
+          <a:p>
+            <a:pPr marL="285750" indent="-285750">
+              <a:buFont typeface="Arial" panose="020B0604020202020204" pitchFamily="34" charset="0"/>
+              <a:buChar char="•"/>
+            </a:pPr>
+            <a:r>
+              <a:rPr lang="en-GB" sz="1200" dirty="0"/>
+              <a:t>E</a:t>
+            </a:r>
+            <a:r>
+              <a:rPr lang="en-CH" sz="1200" dirty="0"/>
+              <a:t>xtract and resolve dependencies</a:t>
+            </a:r>
+          </a:p>
+          <a:p>
+            <a:pPr marL="285750" indent="-285750">
+              <a:buFont typeface="Arial" panose="020B0604020202020204" pitchFamily="34" charset="0"/>
+              <a:buChar char="•"/>
+            </a:pPr>
+            <a:r>
+              <a:rPr lang="en-CH" sz="1200" dirty="0"/>
+              <a:t>Add dependencies to head</a:t>
+            </a:r>
+            <a:endParaRPr lang="en-CH" sz="1400" dirty="0"/>
+          </a:p>
+        </p:txBody>
+      </p:sp>
+      <p:sp>
+        <p:nvSpPr>
+          <p:cNvPr id="87" name="TextBox 86">
+            <a:extLst>
+              <a:ext uri="{FF2B5EF4-FFF2-40B4-BE49-F238E27FC236}">
+                <a16:creationId xmlns:a16="http://schemas.microsoft.com/office/drawing/2014/main" id="{D377E44C-A153-A145-A6AB-016A5996744D}"/>
+              </a:ext>
+            </a:extLst>
+          </p:cNvPr>
+          <p:cNvSpPr txBox="1"/>
+          <p:nvPr/>
+        </p:nvSpPr>
+        <p:spPr>
+          <a:xfrm>
+            <a:off x="8925791" y="5144687"/>
+            <a:ext cx="1974821" cy="307777"/>
+          </a:xfrm>
+          <a:prstGeom prst="rect">
+            <a:avLst/>
+          </a:prstGeom>
+          <a:noFill/>
+        </p:spPr>
+        <p:txBody>
+          <a:bodyPr wrap="square" rtlCol="0">
+            <a:spAutoFit/>
+          </a:bodyPr>
+          <a:lstStyle/>
+          <a:p>
+            <a:r>
+              <a:rPr lang="en-CH" sz="1400" dirty="0"/>
+              <a:t>HTML  + </a:t>
+            </a:r>
+            <a:r>
+              <a:rPr lang="de-CH" sz="1400" dirty="0" err="1"/>
+              <a:t>dependencies</a:t>
+            </a:r>
+            <a:endParaRPr lang="en-CH" sz="1400" dirty="0"/>
+          </a:p>
+        </p:txBody>
+      </p:sp>
+      <p:sp>
+        <p:nvSpPr>
+          <p:cNvPr id="89" name="Rectangle 88">
+            <a:extLst>
+              <a:ext uri="{FF2B5EF4-FFF2-40B4-BE49-F238E27FC236}">
+                <a16:creationId xmlns:a16="http://schemas.microsoft.com/office/drawing/2014/main" id="{BB1A0909-3546-0C46-9E88-54AB6F9AB5C4}"/>
+              </a:ext>
+            </a:extLst>
+          </p:cNvPr>
+          <p:cNvSpPr/>
+          <p:nvPr/>
+        </p:nvSpPr>
+        <p:spPr>
+          <a:xfrm>
+            <a:off x="8400767" y="5833749"/>
+            <a:ext cx="1321196" cy="307777"/>
+          </a:xfrm>
+          <a:prstGeom prst="rect">
+            <a:avLst/>
+          </a:prstGeom>
+        </p:spPr>
+        <p:txBody>
+          <a:bodyPr wrap="none">
+            <a:spAutoFit/>
+          </a:bodyPr>
+          <a:lstStyle/>
+          <a:p>
+            <a:r>
+              <a:rPr lang="en-CH" sz="1400" b="1" dirty="0"/>
+              <a:t>httpResponse()</a:t>
+            </a:r>
+            <a:endParaRPr lang="en-CH" b="1" dirty="0"/>
+          </a:p>
+        </p:txBody>
+      </p:sp>
+      <p:sp>
+        <p:nvSpPr>
+          <p:cNvPr id="90" name="Rectangle 89">
+            <a:extLst>
+              <a:ext uri="{FF2B5EF4-FFF2-40B4-BE49-F238E27FC236}">
+                <a16:creationId xmlns:a16="http://schemas.microsoft.com/office/drawing/2014/main" id="{EF560719-0F90-1443-8EE0-432FEBDF3346}"/>
+              </a:ext>
+            </a:extLst>
+          </p:cNvPr>
+          <p:cNvSpPr/>
+          <p:nvPr/>
+        </p:nvSpPr>
+        <p:spPr>
+          <a:xfrm>
+            <a:off x="5632089" y="3171935"/>
+            <a:ext cx="2256960" cy="307777"/>
+          </a:xfrm>
+          <a:prstGeom prst="rect">
+            <a:avLst/>
+          </a:prstGeom>
+        </p:spPr>
+        <p:txBody>
+          <a:bodyPr wrap="square">
+            <a:spAutoFit/>
+          </a:bodyPr>
+          <a:lstStyle/>
+          <a:p>
+            <a:r>
+              <a:rPr lang="en-CH" sz="1400" b="1" dirty="0"/>
+              <a:t>startServer(host, port, app)</a:t>
+            </a:r>
+            <a:endParaRPr lang="en-CH" b="1" dirty="0"/>
+          </a:p>
+        </p:txBody>
+      </p:sp>
+      <p:cxnSp>
+        <p:nvCxnSpPr>
+          <p:cNvPr id="92" name="Straight Arrow Connector 91">
+            <a:extLst>
+              <a:ext uri="{FF2B5EF4-FFF2-40B4-BE49-F238E27FC236}">
+                <a16:creationId xmlns:a16="http://schemas.microsoft.com/office/drawing/2014/main" id="{2991C581-F22E-034E-8F8D-2BB12627FACF}"/>
+              </a:ext>
+            </a:extLst>
+          </p:cNvPr>
+          <p:cNvCxnSpPr>
+            <a:cxnSpLocks/>
+          </p:cNvCxnSpPr>
+          <p:nvPr/>
+        </p:nvCxnSpPr>
+        <p:spPr>
+          <a:xfrm flipV="1">
+            <a:off x="5095212" y="1651026"/>
+            <a:ext cx="1907859" cy="460866"/>
+          </a:xfrm>
+          <a:prstGeom prst="straightConnector1">
+            <a:avLst/>
+          </a:prstGeom>
+          <a:ln w="38100">
+            <a:solidFill>
+              <a:schemeClr val="bg1">
+                <a:lumMod val="65000"/>
+              </a:schemeClr>
+            </a:solidFill>
+            <a:prstDash val="solid"/>
+            <a:tailEnd type="triangle"/>
+          </a:ln>
+        </p:spPr>
+        <p:style>
+          <a:lnRef idx="1">
+            <a:schemeClr val="accent1"/>
+          </a:lnRef>
+          <a:fillRef idx="0">
+            <a:schemeClr val="accent1"/>
+          </a:fillRef>
+          <a:effectRef idx="0">
+            <a:schemeClr val="accent1"/>
+          </a:effectRef>
+          <a:fontRef idx="minor">
+            <a:schemeClr val="tx1"/>
+          </a:fontRef>
+        </p:style>
+      </p:cxnSp>
+      <p:sp>
+        <p:nvSpPr>
+          <p:cNvPr id="95" name="TextBox 94">
+            <a:extLst>
+              <a:ext uri="{FF2B5EF4-FFF2-40B4-BE49-F238E27FC236}">
+                <a16:creationId xmlns:a16="http://schemas.microsoft.com/office/drawing/2014/main" id="{1D93E40D-5093-1743-996A-50E58E4F6E37}"/>
+              </a:ext>
+            </a:extLst>
+          </p:cNvPr>
+          <p:cNvSpPr txBox="1"/>
+          <p:nvPr/>
+        </p:nvSpPr>
+        <p:spPr>
+          <a:xfrm>
+            <a:off x="5597922" y="1252657"/>
+            <a:ext cx="1298127" cy="307777"/>
+          </a:xfrm>
+          <a:prstGeom prst="rect">
+            <a:avLst/>
+          </a:prstGeom>
+          <a:noFill/>
+        </p:spPr>
+        <p:txBody>
+          <a:bodyPr wrap="square" rtlCol="0">
+            <a:spAutoFit/>
+          </a:bodyPr>
+          <a:lstStyle/>
+          <a:p>
+            <a:r>
+              <a:rPr lang="en-GB" sz="1400" dirty="0">
+                <a:solidFill>
+                  <a:schemeClr val="bg1">
+                    <a:lumMod val="65000"/>
+                  </a:schemeClr>
+                </a:solidFill>
+              </a:rPr>
+              <a:t>F</a:t>
+            </a:r>
+            <a:r>
+              <a:rPr lang="en-CH" sz="1400" dirty="0">
+                <a:solidFill>
+                  <a:schemeClr val="bg1">
+                    <a:lumMod val="65000"/>
+                  </a:schemeClr>
+                </a:solidFill>
+              </a:rPr>
+              <a:t>ind app</a:t>
+            </a:r>
+          </a:p>
+        </p:txBody>
+      </p:sp>
+      <p:sp>
+        <p:nvSpPr>
+          <p:cNvPr id="97" name="Rectangle 96">
+            <a:extLst>
+              <a:ext uri="{FF2B5EF4-FFF2-40B4-BE49-F238E27FC236}">
+                <a16:creationId xmlns:a16="http://schemas.microsoft.com/office/drawing/2014/main" id="{656BFC89-D377-094B-B0BA-90FA36893280}"/>
+              </a:ext>
+            </a:extLst>
+          </p:cNvPr>
+          <p:cNvSpPr/>
+          <p:nvPr/>
+        </p:nvSpPr>
+        <p:spPr>
+          <a:xfrm>
+            <a:off x="6173797" y="4724750"/>
+            <a:ext cx="1745839" cy="1600438"/>
+          </a:xfrm>
+          <a:prstGeom prst="rect">
+            <a:avLst/>
+          </a:prstGeom>
+        </p:spPr>
+        <p:txBody>
+          <a:bodyPr wrap="square">
+            <a:spAutoFit/>
+          </a:bodyPr>
+          <a:lstStyle/>
+          <a:p>
+            <a:r>
+              <a:rPr lang="en-CH" sz="1400" b="1" dirty="0"/>
+              <a:t>httpResponse </a:t>
+            </a:r>
+          </a:p>
+          <a:p>
+            <a:r>
+              <a:rPr lang="en-CH" sz="1400" b="1" dirty="0"/>
+              <a:t>            + </a:t>
+            </a:r>
+          </a:p>
+          <a:p>
+            <a:r>
+              <a:rPr lang="en-CH" sz="1400" b="1" dirty="0"/>
+              <a:t>static paths </a:t>
+            </a:r>
+          </a:p>
+          <a:p>
+            <a:r>
+              <a:rPr lang="en-CH" sz="1400" b="1" dirty="0"/>
+              <a:t>            + </a:t>
+            </a:r>
+          </a:p>
+          <a:p>
+            <a:r>
+              <a:rPr lang="en-CH" sz="1400" b="1" dirty="0"/>
+              <a:t>other options</a:t>
+            </a:r>
+          </a:p>
+          <a:p>
+            <a:r>
+              <a:rPr lang="en-CH" sz="1400" b="1" dirty="0"/>
+              <a:t>            + </a:t>
+            </a:r>
+          </a:p>
+          <a:p>
+            <a:r>
+              <a:rPr lang="en-GB" sz="1400" b="1" dirty="0"/>
+              <a:t>w</a:t>
+            </a:r>
+            <a:r>
+              <a:rPr lang="en-CH" sz="1400" b="1" dirty="0"/>
+              <a:t>ebsocket handler</a:t>
+            </a:r>
+            <a:endParaRPr lang="en-CH" b="1" dirty="0"/>
+          </a:p>
+        </p:txBody>
+      </p:sp>
+      <p:sp>
+        <p:nvSpPr>
+          <p:cNvPr id="98" name="Rectangle 97">
+            <a:extLst>
+              <a:ext uri="{FF2B5EF4-FFF2-40B4-BE49-F238E27FC236}">
+                <a16:creationId xmlns:a16="http://schemas.microsoft.com/office/drawing/2014/main" id="{1ECF82E9-9CDC-F34E-9AC4-222170F60BC7}"/>
+              </a:ext>
+            </a:extLst>
+          </p:cNvPr>
+          <p:cNvSpPr/>
+          <p:nvPr/>
+        </p:nvSpPr>
+        <p:spPr>
+          <a:xfrm>
+            <a:off x="6100531" y="3926022"/>
+            <a:ext cx="1233030" cy="369332"/>
+          </a:xfrm>
+          <a:prstGeom prst="rect">
+            <a:avLst/>
+          </a:prstGeom>
+        </p:spPr>
+        <p:txBody>
+          <a:bodyPr wrap="none">
+            <a:spAutoFit/>
+          </a:bodyPr>
+          <a:lstStyle/>
+          <a:p>
+            <a:r>
+              <a:rPr lang="en-GB" b="1" dirty="0">
+                <a:solidFill>
+                  <a:schemeClr val="bg1">
+                    <a:lumMod val="65000"/>
+                  </a:schemeClr>
+                </a:solidFill>
+              </a:rPr>
+              <a:t>h</a:t>
+            </a:r>
+            <a:r>
+              <a:rPr lang="en-CH" b="1" dirty="0">
+                <a:solidFill>
+                  <a:schemeClr val="bg1">
+                    <a:lumMod val="65000"/>
+                  </a:schemeClr>
+                </a:solidFill>
+              </a:rPr>
+              <a:t>ttpuv app</a:t>
+            </a:r>
+            <a:endParaRPr lang="en-CH" dirty="0">
+              <a:solidFill>
+                <a:schemeClr val="bg1">
+                  <a:lumMod val="65000"/>
+                </a:schemeClr>
+              </a:solidFill>
+            </a:endParaRPr>
+          </a:p>
+        </p:txBody>
+      </p:sp>
+      <p:cxnSp>
+        <p:nvCxnSpPr>
+          <p:cNvPr id="99" name="Straight Arrow Connector 98">
+            <a:extLst>
+              <a:ext uri="{FF2B5EF4-FFF2-40B4-BE49-F238E27FC236}">
+                <a16:creationId xmlns:a16="http://schemas.microsoft.com/office/drawing/2014/main" id="{6E22DE3A-056A-2044-B805-DC6656FC897B}"/>
+              </a:ext>
+            </a:extLst>
+          </p:cNvPr>
+          <p:cNvCxnSpPr>
+            <a:cxnSpLocks/>
+          </p:cNvCxnSpPr>
+          <p:nvPr/>
+        </p:nvCxnSpPr>
+        <p:spPr>
+          <a:xfrm flipV="1">
+            <a:off x="6820821" y="4319405"/>
+            <a:ext cx="0" cy="381294"/>
           </a:xfrm>
           <a:prstGeom prst="straightConnector1">
             <a:avLst/>
@@ -4668,10 +5977,10 @@
       </p:cxnSp>
       <p:cxnSp>
         <p:nvCxnSpPr>
-          <p:cNvPr id="54" name="Straight Arrow Connector 53">
-            <a:extLst>
-              <a:ext uri="{FF2B5EF4-FFF2-40B4-BE49-F238E27FC236}">
-                <a16:creationId xmlns:a16="http://schemas.microsoft.com/office/drawing/2014/main" id="{427A5D31-EF32-8D4B-931C-D723FC600208}"/>
+          <p:cNvPr id="102" name="Straight Arrow Connector 101">
+            <a:extLst>
+              <a:ext uri="{FF2B5EF4-FFF2-40B4-BE49-F238E27FC236}">
+                <a16:creationId xmlns:a16="http://schemas.microsoft.com/office/drawing/2014/main" id="{B583EB52-CDEA-9F4E-BC37-A1F11B8AA75A}"/>
               </a:ext>
             </a:extLst>
           </p:cNvPr>
@@ -4681,9 +5990,9 @@
           <p:nvPr/>
         </p:nvCxnSpPr>
         <p:spPr>
-          <a:xfrm>
-            <a:off x="2415030" y="1822404"/>
-            <a:ext cx="0" cy="753185"/>
+          <a:xfrm flipV="1">
+            <a:off x="6812531" y="3606759"/>
+            <a:ext cx="0" cy="381294"/>
           </a:xfrm>
           <a:prstGeom prst="straightConnector1">
             <a:avLst/>
@@ -4713,64 +6022,58 @@
           </a:fontRef>
         </p:style>
       </p:cxnSp>
-      <p:sp>
-        <p:nvSpPr>
-          <p:cNvPr id="56" name="Rectangle 55">
-            <a:extLst>
-              <a:ext uri="{FF2B5EF4-FFF2-40B4-BE49-F238E27FC236}">
-                <a16:creationId xmlns:a16="http://schemas.microsoft.com/office/drawing/2014/main" id="{BC427626-61D6-0340-A010-8B9909A9354E}"/>
-              </a:ext>
-            </a:extLst>
-          </p:cNvPr>
-          <p:cNvSpPr/>
+      <p:cxnSp>
+        <p:nvCxnSpPr>
+          <p:cNvPr id="105" name="Elbow Connector 104">
+            <a:extLst>
+              <a:ext uri="{FF2B5EF4-FFF2-40B4-BE49-F238E27FC236}">
+                <a16:creationId xmlns:a16="http://schemas.microsoft.com/office/drawing/2014/main" id="{13C264A9-4420-D745-8E47-D2DBD6420B18}"/>
+              </a:ext>
+            </a:extLst>
+          </p:cNvPr>
+          <p:cNvCxnSpPr>
+            <a:cxnSpLocks/>
+          </p:cNvCxnSpPr>
           <p:nvPr/>
-        </p:nvSpPr>
-        <p:spPr>
-          <a:xfrm>
-            <a:off x="1721009" y="3006065"/>
-            <a:ext cx="1749280" cy="2092882"/>
-          </a:xfrm>
-          <a:prstGeom prst="rect">
+        </p:nvCxnSpPr>
+        <p:spPr>
+          <a:xfrm rot="5400000">
+            <a:off x="8689036" y="4959261"/>
+            <a:ext cx="432291" cy="2083356"/>
+          </a:xfrm>
+          <a:prstGeom prst="bentConnector2">
             <a:avLst/>
           </a:prstGeom>
-          <a:noFill/>
-          <a:ln w="63500">
+          <a:ln w="31750">
             <a:solidFill>
-              <a:schemeClr val="tx1"/>
+              <a:schemeClr val="bg1">
+                <a:lumMod val="65000"/>
+              </a:schemeClr>
             </a:solidFill>
+            <a:tailEnd type="triangle"/>
           </a:ln>
         </p:spPr>
         <p:style>
-          <a:lnRef idx="2">
-            <a:schemeClr val="accent1">
-              <a:shade val="50000"/>
-            </a:schemeClr>
+          <a:lnRef idx="1">
+            <a:schemeClr val="accent1"/>
           </a:lnRef>
-          <a:fillRef idx="1">
+          <a:fillRef idx="0">
             <a:schemeClr val="accent1"/>
           </a:fillRef>
           <a:effectRef idx="0">
             <a:schemeClr val="accent1"/>
           </a:effectRef>
           <a:fontRef idx="minor">
-            <a:schemeClr val="lt1"/>
+            <a:schemeClr val="tx1"/>
           </a:fontRef>
         </p:style>
-        <p:txBody>
-          <a:bodyPr rtlCol="0" anchor="ctr"/>
-          <a:lstStyle/>
-          <a:p>
-            <a:pPr algn="ctr"/>
-            <a:endParaRPr lang="en-CH"/>
-          </a:p>
-        </p:txBody>
-      </p:sp>
-      <p:sp>
-        <p:nvSpPr>
-          <p:cNvPr id="57" name="TextBox 56">
-            <a:extLst>
-              <a:ext uri="{FF2B5EF4-FFF2-40B4-BE49-F238E27FC236}">
-                <a16:creationId xmlns:a16="http://schemas.microsoft.com/office/drawing/2014/main" id="{D47F3F3D-F6DF-E44A-A302-2EF728842FE2}"/>
+      </p:cxnSp>
+      <p:sp>
+        <p:nvSpPr>
+          <p:cNvPr id="107" name="TextBox 106">
+            <a:extLst>
+              <a:ext uri="{FF2B5EF4-FFF2-40B4-BE49-F238E27FC236}">
+                <a16:creationId xmlns:a16="http://schemas.microsoft.com/office/drawing/2014/main" id="{3D43A571-8C9C-5C4C-AD33-8C6B360FB6EA}"/>
               </a:ext>
             </a:extLst>
           </p:cNvPr>
@@ -4779,8 +6082,8 @@
         </p:nvSpPr>
         <p:spPr>
           <a:xfrm>
-            <a:off x="1780592" y="3172984"/>
-            <a:ext cx="1398524" cy="2092881"/>
+            <a:off x="5569087" y="2278255"/>
+            <a:ext cx="665235" cy="369332"/>
           </a:xfrm>
           <a:prstGeom prst="rect">
             <a:avLst/>
@@ -4788,67 +6091,28 @@
           <a:noFill/>
         </p:spPr>
         <p:txBody>
-          <a:bodyPr wrap="none" rtlCol="0">
+          <a:bodyPr wrap="square" rtlCol="0">
             <a:spAutoFit/>
           </a:bodyPr>
           <a:lstStyle/>
           <a:p>
             <a:r>
-              <a:rPr lang="en-CH" sz="1400" b="1" dirty="0"/>
-              <a:t>onOpen:</a:t>
-            </a:r>
-          </a:p>
-          <a:p>
-            <a:r>
-              <a:rPr lang="en-CH" sz="1400" b="1" dirty="0"/>
-              <a:t>// do something</a:t>
-            </a:r>
-          </a:p>
-          <a:p>
-            <a:endParaRPr lang="en-CH" sz="1400" b="1" dirty="0"/>
-          </a:p>
-          <a:p>
-            <a:r>
-              <a:rPr lang="en-CH" sz="1400" b="1" dirty="0"/>
-              <a:t>onMessage:</a:t>
-            </a:r>
-          </a:p>
-          <a:p>
-            <a:r>
-              <a:rPr lang="en-CH" sz="1400" b="1" dirty="0"/>
-              <a:t>// do something</a:t>
-            </a:r>
-          </a:p>
-          <a:p>
-            <a:endParaRPr lang="en-CH" sz="1400" b="1" dirty="0"/>
-          </a:p>
-          <a:p>
-            <a:r>
-              <a:rPr lang="en-GB" sz="1400" b="1" dirty="0" err="1"/>
-              <a:t>onClose</a:t>
-            </a:r>
-            <a:r>
-              <a:rPr lang="en-GB" sz="1400" b="1" dirty="0"/>
-              <a:t>:</a:t>
-            </a:r>
-          </a:p>
-          <a:p>
-            <a:r>
-              <a:rPr lang="en-CH" sz="1400" b="1" dirty="0"/>
-              <a:t>// do something</a:t>
-            </a:r>
-          </a:p>
-          <a:p>
-            <a:endParaRPr lang="en-CH" b="1" dirty="0"/>
-          </a:p>
-        </p:txBody>
-      </p:sp>
-      <p:sp>
-        <p:nvSpPr>
-          <p:cNvPr id="58" name="TextBox 57">
-            <a:extLst>
-              <a:ext uri="{FF2B5EF4-FFF2-40B4-BE49-F238E27FC236}">
-                <a16:creationId xmlns:a16="http://schemas.microsoft.com/office/drawing/2014/main" id="{DB82F917-F2E9-624C-97BA-7E804F01E892}"/>
+              <a:rPr lang="en-CH" b="1" dirty="0">
+                <a:solidFill>
+                  <a:srgbClr val="0070C0"/>
+                </a:solidFill>
+              </a:rPr>
+              <a:t>(3)</a:t>
+            </a:r>
+          </a:p>
+        </p:txBody>
+      </p:sp>
+      <p:sp>
+        <p:nvSpPr>
+          <p:cNvPr id="113" name="TextBox 112">
+            <a:extLst>
+              <a:ext uri="{FF2B5EF4-FFF2-40B4-BE49-F238E27FC236}">
+                <a16:creationId xmlns:a16="http://schemas.microsoft.com/office/drawing/2014/main" id="{BC10BEC6-86A3-5946-8707-5B909E9D7131}"/>
               </a:ext>
             </a:extLst>
           </p:cNvPr>
@@ -4857,8 +6121,8 @@
         </p:nvSpPr>
         <p:spPr>
           <a:xfrm>
-            <a:off x="2442262" y="1966797"/>
-            <a:ext cx="1749280" cy="646331"/>
+            <a:off x="7315526" y="5741552"/>
+            <a:ext cx="504395" cy="369332"/>
           </a:xfrm>
           <a:prstGeom prst="rect">
             <a:avLst/>
@@ -4872,26 +6136,54 @@
           <a:lstStyle/>
           <a:p>
             <a:r>
-              <a:rPr lang="en-CH" dirty="0">
+              <a:rPr lang="en-CH" b="1" dirty="0">
+                <a:solidFill>
+                  <a:srgbClr val="0070C0"/>
+                </a:solidFill>
+              </a:rPr>
+              <a:t>(*)</a:t>
+            </a:r>
+          </a:p>
+        </p:txBody>
+      </p:sp>
+      <p:sp>
+        <p:nvSpPr>
+          <p:cNvPr id="114" name="Rectangle 113">
+            <a:extLst>
+              <a:ext uri="{FF2B5EF4-FFF2-40B4-BE49-F238E27FC236}">
+                <a16:creationId xmlns:a16="http://schemas.microsoft.com/office/drawing/2014/main" id="{A545FA9D-0E39-4F49-933C-C03567FDB1EF}"/>
+              </a:ext>
+            </a:extLst>
+          </p:cNvPr>
+          <p:cNvSpPr/>
+          <p:nvPr/>
+        </p:nvSpPr>
+        <p:spPr>
+          <a:xfrm>
+            <a:off x="9677689" y="6233185"/>
+            <a:ext cx="619080" cy="307777"/>
+          </a:xfrm>
+          <a:prstGeom prst="rect">
+            <a:avLst/>
+          </a:prstGeom>
+        </p:spPr>
+        <p:txBody>
+          <a:bodyPr wrap="none">
+            <a:spAutoFit/>
+          </a:bodyPr>
+          <a:lstStyle/>
+          <a:p>
+            <a:r>
+              <a:rPr lang="en-CH" sz="1400" b="1" dirty="0">
                 <a:solidFill>
                   <a:schemeClr val="bg1">
                     <a:lumMod val="65000"/>
                   </a:schemeClr>
                 </a:solidFill>
               </a:rPr>
-              <a:t>Create server websocket</a:t>
-            </a:r>
-            <a:r>
-              <a:rPr lang="en-CH" baseline="30000" dirty="0">
-                <a:solidFill>
-                  <a:schemeClr val="bg1">
-                    <a:lumMod val="65000"/>
-                  </a:schemeClr>
-                </a:solidFill>
-              </a:rPr>
-              <a:t>*</a:t>
-            </a:r>
-            <a:endParaRPr lang="en-CH" dirty="0">
+              <a:t>HTML</a:t>
+            </a:r>
+            <a:endParaRPr lang="en-CH" b="1" dirty="0">
               <a:solidFill>
                 <a:schemeClr val="bg1">
                   <a:lumMod val="65000"/>
@@ -4903,10 +6195,10 @@
       </p:sp>
       <p:sp>
         <p:nvSpPr>
-          <p:cNvPr id="59" name="TextBox 58">
-            <a:extLst>
-              <a:ext uri="{FF2B5EF4-FFF2-40B4-BE49-F238E27FC236}">
-                <a16:creationId xmlns:a16="http://schemas.microsoft.com/office/drawing/2014/main" id="{E1F6F134-3EEE-A942-A7AD-8230220561A4}"/>
+          <p:cNvPr id="122" name="TextBox 121">
+            <a:extLst>
+              <a:ext uri="{FF2B5EF4-FFF2-40B4-BE49-F238E27FC236}">
+                <a16:creationId xmlns:a16="http://schemas.microsoft.com/office/drawing/2014/main" id="{DA058841-C203-D04C-B582-FB524185FE2F}"/>
               </a:ext>
             </a:extLst>
           </p:cNvPr>
@@ -4915,404 +6207,7 @@
         </p:nvSpPr>
         <p:spPr>
           <a:xfrm>
-            <a:off x="1639520" y="2654481"/>
-            <a:ext cx="1962720" cy="369332"/>
-          </a:xfrm>
-          <a:prstGeom prst="rect">
-            <a:avLst/>
-          </a:prstGeom>
-          <a:noFill/>
-        </p:spPr>
-        <p:txBody>
-          <a:bodyPr wrap="square" rtlCol="0">
-            <a:spAutoFit/>
-          </a:bodyPr>
-          <a:lstStyle/>
-          <a:p>
-            <a:r>
-              <a:rPr lang="en-CH" dirty="0"/>
-              <a:t>Server ws handler</a:t>
-            </a:r>
-          </a:p>
-        </p:txBody>
-      </p:sp>
-      <p:sp>
-        <p:nvSpPr>
-          <p:cNvPr id="60" name="Rectangle 59">
-            <a:extLst>
-              <a:ext uri="{FF2B5EF4-FFF2-40B4-BE49-F238E27FC236}">
-                <a16:creationId xmlns:a16="http://schemas.microsoft.com/office/drawing/2014/main" id="{866D73C8-573B-444B-A465-F14A93436668}"/>
-              </a:ext>
-            </a:extLst>
-          </p:cNvPr>
-          <p:cNvSpPr/>
-          <p:nvPr/>
-        </p:nvSpPr>
-        <p:spPr>
-          <a:xfrm>
-            <a:off x="1186214" y="1245892"/>
-            <a:ext cx="590341" cy="513162"/>
-          </a:xfrm>
-          <a:prstGeom prst="rect">
-            <a:avLst/>
-          </a:prstGeom>
-          <a:solidFill>
-            <a:schemeClr val="tx1">
-              <a:lumMod val="75000"/>
-              <a:lumOff val="25000"/>
-            </a:schemeClr>
-          </a:solidFill>
-          <a:ln w="63500">
-            <a:solidFill>
-              <a:schemeClr val="tx1">
-                <a:lumMod val="75000"/>
-                <a:lumOff val="25000"/>
-              </a:schemeClr>
-            </a:solidFill>
-          </a:ln>
-        </p:spPr>
-        <p:style>
-          <a:lnRef idx="2">
-            <a:schemeClr val="accent1">
-              <a:shade val="50000"/>
-            </a:schemeClr>
-          </a:lnRef>
-          <a:fillRef idx="1">
-            <a:schemeClr val="accent1"/>
-          </a:fillRef>
-          <a:effectRef idx="0">
-            <a:schemeClr val="accent1"/>
-          </a:effectRef>
-          <a:fontRef idx="minor">
-            <a:schemeClr val="lt1"/>
-          </a:fontRef>
-        </p:style>
-        <p:txBody>
-          <a:bodyPr rtlCol="0" anchor="ctr"/>
-          <a:lstStyle/>
-          <a:p>
-            <a:pPr algn="ctr"/>
-            <a:endParaRPr lang="en-CH">
-              <a:solidFill>
-                <a:schemeClr val="tx1">
-                  <a:lumMod val="65000"/>
-                  <a:lumOff val="35000"/>
-                </a:schemeClr>
-              </a:solidFill>
-            </a:endParaRPr>
-          </a:p>
-        </p:txBody>
-      </p:sp>
-      <p:sp>
-        <p:nvSpPr>
-          <p:cNvPr id="61" name="Rectangle 60">
-            <a:extLst>
-              <a:ext uri="{FF2B5EF4-FFF2-40B4-BE49-F238E27FC236}">
-                <a16:creationId xmlns:a16="http://schemas.microsoft.com/office/drawing/2014/main" id="{EF78AC9C-D2BC-3447-A221-4CF4FFD09500}"/>
-              </a:ext>
-            </a:extLst>
-          </p:cNvPr>
-          <p:cNvSpPr/>
-          <p:nvPr/>
-        </p:nvSpPr>
-        <p:spPr>
-          <a:xfrm>
-            <a:off x="325334" y="1244451"/>
-            <a:ext cx="590341" cy="513162"/>
-          </a:xfrm>
-          <a:prstGeom prst="rect">
-            <a:avLst/>
-          </a:prstGeom>
-          <a:solidFill>
-            <a:schemeClr val="tx1">
-              <a:lumMod val="75000"/>
-              <a:lumOff val="25000"/>
-            </a:schemeClr>
-          </a:solidFill>
-          <a:ln w="63500">
-            <a:solidFill>
-              <a:schemeClr val="tx1">
-                <a:lumMod val="75000"/>
-                <a:lumOff val="25000"/>
-              </a:schemeClr>
-            </a:solidFill>
-          </a:ln>
-        </p:spPr>
-        <p:style>
-          <a:lnRef idx="2">
-            <a:schemeClr val="accent1">
-              <a:shade val="50000"/>
-            </a:schemeClr>
-          </a:lnRef>
-          <a:fillRef idx="1">
-            <a:schemeClr val="accent1"/>
-          </a:fillRef>
-          <a:effectRef idx="0">
-            <a:schemeClr val="accent1"/>
-          </a:effectRef>
-          <a:fontRef idx="minor">
-            <a:schemeClr val="lt1"/>
-          </a:fontRef>
-        </p:style>
-        <p:txBody>
-          <a:bodyPr rtlCol="0" anchor="ctr"/>
-          <a:lstStyle/>
-          <a:p>
-            <a:pPr algn="ctr"/>
-            <a:endParaRPr lang="en-CH">
-              <a:solidFill>
-                <a:schemeClr val="tx1">
-                  <a:lumMod val="65000"/>
-                  <a:lumOff val="35000"/>
-                </a:schemeClr>
-              </a:solidFill>
-            </a:endParaRPr>
-          </a:p>
-        </p:txBody>
-      </p:sp>
-      <p:sp>
-        <p:nvSpPr>
-          <p:cNvPr id="63" name="TextBox 62">
-            <a:extLst>
-              <a:ext uri="{FF2B5EF4-FFF2-40B4-BE49-F238E27FC236}">
-                <a16:creationId xmlns:a16="http://schemas.microsoft.com/office/drawing/2014/main" id="{36C16596-DB10-474B-912B-D5980D030DD6}"/>
-              </a:ext>
-            </a:extLst>
-          </p:cNvPr>
-          <p:cNvSpPr txBox="1"/>
-          <p:nvPr/>
-        </p:nvSpPr>
-        <p:spPr>
-          <a:xfrm>
-            <a:off x="9476899" y="273597"/>
-            <a:ext cx="982448" cy="369332"/>
-          </a:xfrm>
-          <a:prstGeom prst="rect">
-            <a:avLst/>
-          </a:prstGeom>
-          <a:noFill/>
-        </p:spPr>
-        <p:txBody>
-          <a:bodyPr wrap="none" rtlCol="0">
-            <a:spAutoFit/>
-          </a:bodyPr>
-          <a:lstStyle/>
-          <a:p>
-            <a:r>
-              <a:rPr lang="en-CH" b="1" dirty="0"/>
-              <a:t>Client 1</a:t>
-            </a:r>
-            <a:r>
-              <a:rPr lang="en-CH" b="1" baseline="30000" dirty="0"/>
-              <a:t>*</a:t>
-            </a:r>
-            <a:endParaRPr lang="en-CH" b="1" dirty="0"/>
-          </a:p>
-        </p:txBody>
-      </p:sp>
-      <p:sp>
-        <p:nvSpPr>
-          <p:cNvPr id="64" name="Rectangle 63">
-            <a:extLst>
-              <a:ext uri="{FF2B5EF4-FFF2-40B4-BE49-F238E27FC236}">
-                <a16:creationId xmlns:a16="http://schemas.microsoft.com/office/drawing/2014/main" id="{28080729-9465-F54E-9829-3C69C367781B}"/>
-              </a:ext>
-            </a:extLst>
-          </p:cNvPr>
-          <p:cNvSpPr/>
-          <p:nvPr/>
-        </p:nvSpPr>
-        <p:spPr>
-          <a:xfrm>
-            <a:off x="154280" y="1128556"/>
-            <a:ext cx="2611734" cy="810389"/>
-          </a:xfrm>
-          <a:prstGeom prst="rect">
-            <a:avLst/>
-          </a:prstGeom>
-          <a:noFill/>
-          <a:ln w="63500">
-            <a:solidFill>
-              <a:schemeClr val="tx1">
-                <a:lumMod val="95000"/>
-                <a:lumOff val="5000"/>
-              </a:schemeClr>
-            </a:solidFill>
-            <a:prstDash val="sysDash"/>
-          </a:ln>
-        </p:spPr>
-        <p:style>
-          <a:lnRef idx="2">
-            <a:schemeClr val="accent1">
-              <a:shade val="50000"/>
-            </a:schemeClr>
-          </a:lnRef>
-          <a:fillRef idx="1">
-            <a:schemeClr val="accent1"/>
-          </a:fillRef>
-          <a:effectRef idx="0">
-            <a:schemeClr val="accent1"/>
-          </a:effectRef>
-          <a:fontRef idx="minor">
-            <a:schemeClr val="lt1"/>
-          </a:fontRef>
-        </p:style>
-        <p:txBody>
-          <a:bodyPr rtlCol="0" anchor="ctr"/>
-          <a:lstStyle/>
-          <a:p>
-            <a:pPr algn="ctr"/>
-            <a:endParaRPr lang="en-CH" dirty="0">
-              <a:solidFill>
-                <a:schemeClr val="bg1">
-                  <a:lumMod val="65000"/>
-                </a:schemeClr>
-              </a:solidFill>
-            </a:endParaRPr>
-          </a:p>
-        </p:txBody>
-      </p:sp>
-      <p:sp>
-        <p:nvSpPr>
-          <p:cNvPr id="65" name="TextBox 64">
-            <a:extLst>
-              <a:ext uri="{FF2B5EF4-FFF2-40B4-BE49-F238E27FC236}">
-                <a16:creationId xmlns:a16="http://schemas.microsoft.com/office/drawing/2014/main" id="{EADA0A7D-5C45-4146-971F-1CF93123F290}"/>
-              </a:ext>
-            </a:extLst>
-          </p:cNvPr>
-          <p:cNvSpPr txBox="1"/>
-          <p:nvPr/>
-        </p:nvSpPr>
-        <p:spPr>
-          <a:xfrm>
-            <a:off x="429343" y="2014331"/>
-            <a:ext cx="1826992" cy="369332"/>
-          </a:xfrm>
-          <a:prstGeom prst="rect">
-            <a:avLst/>
-          </a:prstGeom>
-          <a:noFill/>
-        </p:spPr>
-        <p:txBody>
-          <a:bodyPr wrap="square" rtlCol="0">
-            <a:spAutoFit/>
-          </a:bodyPr>
-          <a:lstStyle/>
-          <a:p>
-            <a:r>
-              <a:rPr lang="en-GB" dirty="0"/>
-              <a:t>s</a:t>
-            </a:r>
-            <a:r>
-              <a:rPr lang="en-CH" dirty="0"/>
-              <a:t>rv/shiny-server/</a:t>
-            </a:r>
-          </a:p>
-        </p:txBody>
-      </p:sp>
-      <p:sp>
-        <p:nvSpPr>
-          <p:cNvPr id="66" name="TextBox 65">
-            <a:extLst>
-              <a:ext uri="{FF2B5EF4-FFF2-40B4-BE49-F238E27FC236}">
-                <a16:creationId xmlns:a16="http://schemas.microsoft.com/office/drawing/2014/main" id="{2555CF2D-F277-2C45-987C-BCA5C275C05E}"/>
-              </a:ext>
-            </a:extLst>
-          </p:cNvPr>
-          <p:cNvSpPr txBox="1"/>
-          <p:nvPr/>
-        </p:nvSpPr>
-        <p:spPr>
-          <a:xfrm>
-            <a:off x="46412" y="6267040"/>
-            <a:ext cx="5080287" cy="584775"/>
-          </a:xfrm>
-          <a:prstGeom prst="rect">
-            <a:avLst/>
-          </a:prstGeom>
-          <a:noFill/>
-        </p:spPr>
-        <p:txBody>
-          <a:bodyPr wrap="square" rtlCol="0">
-            <a:spAutoFit/>
-          </a:bodyPr>
-          <a:lstStyle/>
-          <a:p>
-            <a:r>
-              <a:rPr lang="en-CH" sz="1600" baseline="30000" dirty="0"/>
-              <a:t>*</a:t>
-            </a:r>
-            <a:r>
-              <a:rPr lang="en-CH" sz="1600" dirty="0"/>
-              <a:t>{httpuv} is able to serve </a:t>
-            </a:r>
-            <a:r>
-              <a:rPr lang="en-CH" sz="1600" b="1" dirty="0"/>
-              <a:t>multiple</a:t>
-            </a:r>
-            <a:r>
-              <a:rPr lang="en-CH" sz="1600" dirty="0"/>
-              <a:t> client but cannot forward the same message to multiple clients (multi cast)</a:t>
-            </a:r>
-            <a:endParaRPr lang="en-CH" sz="1600" baseline="30000" dirty="0"/>
-          </a:p>
-        </p:txBody>
-      </p:sp>
-      <p:sp>
-        <p:nvSpPr>
-          <p:cNvPr id="67" name="TextBox 66">
-            <a:extLst>
-              <a:ext uri="{FF2B5EF4-FFF2-40B4-BE49-F238E27FC236}">
-                <a16:creationId xmlns:a16="http://schemas.microsoft.com/office/drawing/2014/main" id="{3AE7182C-5FBF-D54D-A8A2-77C8855D3B69}"/>
-              </a:ext>
-            </a:extLst>
-          </p:cNvPr>
-          <p:cNvSpPr txBox="1"/>
-          <p:nvPr/>
-        </p:nvSpPr>
-        <p:spPr>
-          <a:xfrm>
-            <a:off x="3681474" y="2175133"/>
-            <a:ext cx="665235" cy="369332"/>
-          </a:xfrm>
-          <a:prstGeom prst="rect">
-            <a:avLst/>
-          </a:prstGeom>
-          <a:noFill/>
-        </p:spPr>
-        <p:txBody>
-          <a:bodyPr wrap="square" rtlCol="0">
-            <a:spAutoFit/>
-          </a:bodyPr>
-          <a:lstStyle/>
-          <a:p>
-            <a:r>
-              <a:rPr lang="en-CH" b="1" dirty="0">
-                <a:solidFill>
-                  <a:srgbClr val="0070C0"/>
-                </a:solidFill>
-              </a:rPr>
-              <a:t>(4)</a:t>
-            </a:r>
-          </a:p>
-        </p:txBody>
-      </p:sp>
-      <p:sp>
-        <p:nvSpPr>
-          <p:cNvPr id="68" name="TextBox 67">
-            <a:extLst>
-              <a:ext uri="{FF2B5EF4-FFF2-40B4-BE49-F238E27FC236}">
-                <a16:creationId xmlns:a16="http://schemas.microsoft.com/office/drawing/2014/main" id="{2691C810-822D-7342-91B4-35801E89058C}"/>
-              </a:ext>
-            </a:extLst>
-          </p:cNvPr>
-          <p:cNvSpPr txBox="1"/>
-          <p:nvPr/>
-        </p:nvSpPr>
-        <p:spPr>
-          <a:xfrm>
-            <a:off x="8649605" y="2221234"/>
+            <a:off x="337605" y="2418001"/>
             <a:ext cx="665235" cy="369332"/>
           </a:xfrm>
           <a:prstGeom prst="rect">
@@ -5333,41 +6228,6 @@
                 </a:solidFill>
               </a:rPr>
               <a:t>(5)</a:t>
-            </a:r>
-          </a:p>
-        </p:txBody>
-      </p:sp>
-      <p:sp>
-        <p:nvSpPr>
-          <p:cNvPr id="69" name="TextBox 68">
-            <a:extLst>
-              <a:ext uri="{FF2B5EF4-FFF2-40B4-BE49-F238E27FC236}">
-                <a16:creationId xmlns:a16="http://schemas.microsoft.com/office/drawing/2014/main" id="{B57E8E33-6DF0-2345-A9C8-84C39648C05A}"/>
-              </a:ext>
-            </a:extLst>
-          </p:cNvPr>
-          <p:cNvSpPr txBox="1"/>
-          <p:nvPr/>
-        </p:nvSpPr>
-        <p:spPr>
-          <a:xfrm>
-            <a:off x="9247395" y="1652089"/>
-            <a:ext cx="1758392" cy="646331"/>
-          </a:xfrm>
-          <a:prstGeom prst="rect">
-            <a:avLst/>
-          </a:prstGeom>
-          <a:noFill/>
-        </p:spPr>
-        <p:txBody>
-          <a:bodyPr wrap="square" rtlCol="0">
-            <a:spAutoFit/>
-          </a:bodyPr>
-          <a:lstStyle/>
-          <a:p>
-            <a:r>
-              <a:rPr lang="en-CH" b="1" dirty="0"/>
-              <a:t>Shiny App UI (HTML/JS/CSS)</a:t>
             </a:r>
           </a:p>
         </p:txBody>

</xml_diff>